<commit_message>
part 2 (regex and text normalization added)
</commit_message>
<xml_diff>
--- a/5_seminar/Contents_Part_02/Präsentation_Teil2.pptx
+++ b/5_seminar/Contents_Part_02/Präsentation_Teil2.pptx
@@ -5,7 +5,7 @@
     <p:sldMasterId id="2147483648" r:id="rId1"/>
   </p:sldMasterIdLst>
   <p:notesMasterIdLst>
-    <p:notesMasterId r:id="rId15"/>
+    <p:notesMasterId r:id="rId20"/>
   </p:notesMasterIdLst>
   <p:sldIdLst>
     <p:sldId id="256" r:id="rId2"/>
@@ -17,10 +17,15 @@
     <p:sldId id="278" r:id="rId8"/>
     <p:sldId id="279" r:id="rId9"/>
     <p:sldId id="280" r:id="rId10"/>
-    <p:sldId id="272" r:id="rId11"/>
-    <p:sldId id="267" r:id="rId12"/>
-    <p:sldId id="273" r:id="rId13"/>
-    <p:sldId id="274" r:id="rId14"/>
+    <p:sldId id="283" r:id="rId11"/>
+    <p:sldId id="284" r:id="rId12"/>
+    <p:sldId id="286" r:id="rId13"/>
+    <p:sldId id="287" r:id="rId14"/>
+    <p:sldId id="288" r:id="rId15"/>
+    <p:sldId id="272" r:id="rId16"/>
+    <p:sldId id="267" r:id="rId17"/>
+    <p:sldId id="273" r:id="rId18"/>
+    <p:sldId id="274" r:id="rId19"/>
   </p:sldIdLst>
   <p:sldSz cx="12192000" cy="6858000"/>
   <p:notesSz cx="6858000" cy="9144000"/>
@@ -769,19 +774,7 @@
                 <a:ea typeface="+mn-ea"/>
                 <a:cs typeface="+mn-cs"/>
               </a:rPr>
-              <a:t>using </a:t>
-            </a:r>
-            <a:r>
-              <a:rPr lang="en-GB" sz="1200" b="0" i="0" kern="1200" dirty="0" smtClean="0">
-                <a:solidFill>
-                  <a:schemeClr val="tx1"/>
-                </a:solidFill>
-                <a:effectLst/>
-                <a:latin typeface="+mn-lt"/>
-                <a:ea typeface="+mn-ea"/>
-                <a:cs typeface="+mn-cs"/>
-              </a:rPr>
-              <a:t>Google chrome and I can access the extension in the extension bar to the top right</a:t>
+              <a:t>using Google chrome and I can access the extension in the extension bar to the top right</a:t>
             </a:r>
           </a:p>
           <a:p>
@@ -936,6 +929,376 @@
     <p:extLst>
       <p:ext uri="{BB962C8B-B14F-4D97-AF65-F5344CB8AC3E}">
         <p14:creationId xmlns:p14="http://schemas.microsoft.com/office/powerpoint/2010/main" val="3612724440"/>
+      </p:ext>
+    </p:extLst>
+  </p:cSld>
+  <p:clrMapOvr>
+    <a:masterClrMapping/>
+  </p:clrMapOvr>
+</p:notes>
+</file>
+
+<file path=ppt/notesSlides/notesSlide5.xml><?xml version="1.0" encoding="utf-8"?>
+<p:notes xmlns:a="http://schemas.openxmlformats.org/drawingml/2006/main" xmlns:r="http://schemas.openxmlformats.org/officeDocument/2006/relationships" xmlns:p="http://schemas.openxmlformats.org/presentationml/2006/main">
+  <p:cSld>
+    <p:spTree>
+      <p:nvGrpSpPr>
+        <p:cNvPr id="1" name=""/>
+        <p:cNvGrpSpPr/>
+        <p:nvPr/>
+      </p:nvGrpSpPr>
+      <p:grpSpPr>
+        <a:xfrm>
+          <a:off x="0" y="0"/>
+          <a:ext cx="0" cy="0"/>
+          <a:chOff x="0" y="0"/>
+          <a:chExt cx="0" cy="0"/>
+        </a:xfrm>
+      </p:grpSpPr>
+      <p:sp>
+        <p:nvSpPr>
+          <p:cNvPr id="2" name="Folienbildplatzhalter 1"/>
+          <p:cNvSpPr>
+            <a:spLocks noGrp="1" noRot="1" noChangeAspect="1"/>
+          </p:cNvSpPr>
+          <p:nvPr>
+            <p:ph type="sldImg"/>
+          </p:nvPr>
+        </p:nvSpPr>
+        <p:spPr/>
+      </p:sp>
+      <p:sp>
+        <p:nvSpPr>
+          <p:cNvPr id="3" name="Notizenplatzhalter 2"/>
+          <p:cNvSpPr>
+            <a:spLocks noGrp="1"/>
+          </p:cNvSpPr>
+          <p:nvPr>
+            <p:ph type="body" idx="1"/>
+          </p:nvPr>
+        </p:nvSpPr>
+        <p:spPr/>
+        <p:txBody>
+          <a:bodyPr/>
+          <a:lstStyle/>
+          <a:p>
+            <a:r>
+              <a:rPr lang="en-GB" sz="1200" b="0" i="0" u="none" strike="noStrike" kern="1200" baseline="0" dirty="0" smtClean="0">
+                <a:solidFill>
+                  <a:schemeClr val="tx1"/>
+                </a:solidFill>
+                <a:latin typeface="+mn-lt"/>
+                <a:ea typeface="+mn-ea"/>
+                <a:cs typeface="+mn-cs"/>
+              </a:rPr>
+              <a:t>punctuation or special characters do not have much significance when we</a:t>
+            </a:r>
+          </a:p>
+          <a:p>
+            <a:r>
+              <a:rPr lang="en-GB" sz="1200" b="0" i="0" u="none" strike="noStrike" kern="1200" baseline="0" dirty="0" err="1" smtClean="0">
+                <a:solidFill>
+                  <a:schemeClr val="tx1"/>
+                </a:solidFill>
+                <a:latin typeface="+mn-lt"/>
+                <a:ea typeface="+mn-ea"/>
+                <a:cs typeface="+mn-cs"/>
+              </a:rPr>
+              <a:t>analyze</a:t>
+            </a:r>
+            <a:r>
+              <a:rPr lang="en-GB" sz="1200" b="0" i="0" u="none" strike="noStrike" kern="1200" baseline="0" dirty="0" smtClean="0">
+                <a:solidFill>
+                  <a:schemeClr val="tx1"/>
+                </a:solidFill>
+                <a:latin typeface="+mn-lt"/>
+                <a:ea typeface="+mn-ea"/>
+                <a:cs typeface="+mn-cs"/>
+              </a:rPr>
+              <a:t> the text and utilize it for extracting features or information based on NLP and ML.</a:t>
+            </a:r>
+            <a:endParaRPr lang="en-US" dirty="0"/>
+          </a:p>
+        </p:txBody>
+      </p:sp>
+      <p:sp>
+        <p:nvSpPr>
+          <p:cNvPr id="4" name="Foliennummernplatzhalter 3"/>
+          <p:cNvSpPr>
+            <a:spLocks noGrp="1"/>
+          </p:cNvSpPr>
+          <p:nvPr>
+            <p:ph type="sldNum" sz="quarter" idx="10"/>
+          </p:nvPr>
+        </p:nvSpPr>
+        <p:spPr/>
+        <p:txBody>
+          <a:bodyPr/>
+          <a:lstStyle/>
+          <a:p>
+            <a:fld id="{20A41429-B750-4047-B563-2878417A70E7}" type="slidenum">
+              <a:rPr lang="en-US" smtClean="0"/>
+              <a:t>12</a:t>
+            </a:fld>
+            <a:endParaRPr lang="en-US"/>
+          </a:p>
+        </p:txBody>
+      </p:sp>
+    </p:spTree>
+    <p:extLst>
+      <p:ext uri="{BB962C8B-B14F-4D97-AF65-F5344CB8AC3E}">
+        <p14:creationId xmlns:p14="http://schemas.microsoft.com/office/powerpoint/2010/main" val="1694319317"/>
+      </p:ext>
+    </p:extLst>
+  </p:cSld>
+  <p:clrMapOvr>
+    <a:masterClrMapping/>
+  </p:clrMapOvr>
+</p:notes>
+</file>
+
+<file path=ppt/notesSlides/notesSlide6.xml><?xml version="1.0" encoding="utf-8"?>
+<p:notes xmlns:a="http://schemas.openxmlformats.org/drawingml/2006/main" xmlns:r="http://schemas.openxmlformats.org/officeDocument/2006/relationships" xmlns:p="http://schemas.openxmlformats.org/presentationml/2006/main">
+  <p:cSld>
+    <p:spTree>
+      <p:nvGrpSpPr>
+        <p:cNvPr id="1" name=""/>
+        <p:cNvGrpSpPr/>
+        <p:nvPr/>
+      </p:nvGrpSpPr>
+      <p:grpSpPr>
+        <a:xfrm>
+          <a:off x="0" y="0"/>
+          <a:ext cx="0" cy="0"/>
+          <a:chOff x="0" y="0"/>
+          <a:chExt cx="0" cy="0"/>
+        </a:xfrm>
+      </p:grpSpPr>
+      <p:sp>
+        <p:nvSpPr>
+          <p:cNvPr id="2" name="Folienbildplatzhalter 1"/>
+          <p:cNvSpPr>
+            <a:spLocks noGrp="1" noRot="1" noChangeAspect="1"/>
+          </p:cNvSpPr>
+          <p:nvPr>
+            <p:ph type="sldImg"/>
+          </p:nvPr>
+        </p:nvSpPr>
+        <p:spPr/>
+      </p:sp>
+      <p:sp>
+        <p:nvSpPr>
+          <p:cNvPr id="3" name="Notizenplatzhalter 2"/>
+          <p:cNvSpPr>
+            <a:spLocks noGrp="1"/>
+          </p:cNvSpPr>
+          <p:nvPr>
+            <p:ph type="body" idx="1"/>
+          </p:nvPr>
+        </p:nvSpPr>
+        <p:spPr/>
+        <p:txBody>
+          <a:bodyPr/>
+          <a:lstStyle/>
+          <a:p>
+            <a:r>
+              <a:rPr lang="de-DE" dirty="0" smtClean="0"/>
+              <a:t>Ziel ist möglichst gute Suchergebnisse zu liefern</a:t>
+            </a:r>
+          </a:p>
+          <a:p>
+            <a:r>
+              <a:rPr lang="de-DE" dirty="0" smtClean="0"/>
+              <a:t>Dafür werden verschiedene Verfahren eingesetzt. </a:t>
+            </a:r>
+          </a:p>
+          <a:p>
+            <a:r>
+              <a:rPr lang="de-DE" dirty="0" err="1" smtClean="0"/>
+              <a:t>Stemming</a:t>
+            </a:r>
+            <a:r>
+              <a:rPr lang="de-DE" dirty="0" smtClean="0"/>
+              <a:t> (Grundformenreduktion) ist ein Verfahren, mit dem verschiedene morphologische Varianten eines Wortes auf ihren gemeinsamen Wortstamm (</a:t>
+            </a:r>
+            <a:r>
+              <a:rPr lang="de-DE" dirty="0" err="1" smtClean="0"/>
+              <a:t>stem</a:t>
+            </a:r>
+            <a:r>
+              <a:rPr lang="de-DE" dirty="0" smtClean="0"/>
+              <a:t>) zurückgeführt werden </a:t>
+            </a:r>
+          </a:p>
+          <a:p>
+            <a:r>
+              <a:rPr lang="de-DE" dirty="0" smtClean="0"/>
+              <a:t>Die Idee: die eigentliche lexikalische Bedeutung eines Wortes ist in seinem Stamm zu finden</a:t>
+            </a:r>
+            <a:endParaRPr lang="en-US" dirty="0"/>
+          </a:p>
+        </p:txBody>
+      </p:sp>
+      <p:sp>
+        <p:nvSpPr>
+          <p:cNvPr id="4" name="Foliennummernplatzhalter 3"/>
+          <p:cNvSpPr>
+            <a:spLocks noGrp="1"/>
+          </p:cNvSpPr>
+          <p:nvPr>
+            <p:ph type="sldNum" sz="quarter" idx="10"/>
+          </p:nvPr>
+        </p:nvSpPr>
+        <p:spPr/>
+        <p:txBody>
+          <a:bodyPr/>
+          <a:lstStyle/>
+          <a:p>
+            <a:fld id="{20A41429-B750-4047-B563-2878417A70E7}" type="slidenum">
+              <a:rPr lang="en-US" smtClean="0"/>
+              <a:t>13</a:t>
+            </a:fld>
+            <a:endParaRPr lang="en-US"/>
+          </a:p>
+        </p:txBody>
+      </p:sp>
+    </p:spTree>
+    <p:extLst>
+      <p:ext uri="{BB962C8B-B14F-4D97-AF65-F5344CB8AC3E}">
+        <p14:creationId xmlns:p14="http://schemas.microsoft.com/office/powerpoint/2010/main" val="2576706226"/>
+      </p:ext>
+    </p:extLst>
+  </p:cSld>
+  <p:clrMapOvr>
+    <a:masterClrMapping/>
+  </p:clrMapOvr>
+</p:notes>
+</file>
+
+<file path=ppt/notesSlides/notesSlide7.xml><?xml version="1.0" encoding="utf-8"?>
+<p:notes xmlns:a="http://schemas.openxmlformats.org/drawingml/2006/main" xmlns:r="http://schemas.openxmlformats.org/officeDocument/2006/relationships" xmlns:p="http://schemas.openxmlformats.org/presentationml/2006/main">
+  <p:cSld>
+    <p:spTree>
+      <p:nvGrpSpPr>
+        <p:cNvPr id="1" name=""/>
+        <p:cNvGrpSpPr/>
+        <p:nvPr/>
+      </p:nvGrpSpPr>
+      <p:grpSpPr>
+        <a:xfrm>
+          <a:off x="0" y="0"/>
+          <a:ext cx="0" cy="0"/>
+          <a:chOff x="0" y="0"/>
+          <a:chExt cx="0" cy="0"/>
+        </a:xfrm>
+      </p:grpSpPr>
+      <p:sp>
+        <p:nvSpPr>
+          <p:cNvPr id="2" name="Folienbildplatzhalter 1"/>
+          <p:cNvSpPr>
+            <a:spLocks noGrp="1" noRot="1" noChangeAspect="1"/>
+          </p:cNvSpPr>
+          <p:nvPr>
+            <p:ph type="sldImg"/>
+          </p:nvPr>
+        </p:nvSpPr>
+        <p:spPr/>
+      </p:sp>
+      <p:sp>
+        <p:nvSpPr>
+          <p:cNvPr id="3" name="Notizenplatzhalter 2"/>
+          <p:cNvSpPr>
+            <a:spLocks noGrp="1"/>
+          </p:cNvSpPr>
+          <p:nvPr>
+            <p:ph type="body" idx="1"/>
+          </p:nvPr>
+        </p:nvSpPr>
+        <p:spPr/>
+        <p:txBody>
+          <a:bodyPr/>
+          <a:lstStyle/>
+          <a:p>
+            <a:r>
+              <a:rPr lang="en-US" dirty="0" smtClean="0"/>
+              <a:t>Slower </a:t>
+            </a:r>
+            <a:r>
+              <a:rPr lang="en-US" dirty="0" err="1" smtClean="0"/>
+              <a:t>bc</a:t>
+            </a:r>
+            <a:r>
+              <a:rPr lang="en-US" dirty="0" smtClean="0"/>
+              <a:t> </a:t>
+            </a:r>
+            <a:r>
+              <a:rPr lang="en-US" sz="1200" b="0" i="0" u="none" strike="noStrike" kern="1200" baseline="0" dirty="0" smtClean="0">
+                <a:solidFill>
+                  <a:schemeClr val="tx1"/>
+                </a:solidFill>
+                <a:latin typeface="+mn-lt"/>
+                <a:ea typeface="+mn-ea"/>
+                <a:cs typeface="+mn-cs"/>
+              </a:rPr>
+              <a:t>an</a:t>
+            </a:r>
+          </a:p>
+          <a:p>
+            <a:r>
+              <a:rPr lang="en-GB" sz="1200" b="0" i="0" u="none" strike="noStrike" kern="1200" baseline="0" dirty="0" smtClean="0">
+                <a:solidFill>
+                  <a:schemeClr val="tx1"/>
+                </a:solidFill>
+                <a:latin typeface="+mn-lt"/>
+                <a:ea typeface="+mn-ea"/>
+                <a:cs typeface="+mn-cs"/>
+              </a:rPr>
+              <a:t>additional step is involved where the root form or lemma is formed by removing the affix</a:t>
+            </a:r>
+          </a:p>
+          <a:p>
+            <a:r>
+              <a:rPr lang="en-GB" sz="1200" b="0" i="0" u="none" strike="noStrike" kern="1200" baseline="0" dirty="0" smtClean="0">
+                <a:solidFill>
+                  <a:schemeClr val="tx1"/>
+                </a:solidFill>
+                <a:latin typeface="+mn-lt"/>
+                <a:ea typeface="+mn-ea"/>
+                <a:cs typeface="+mn-cs"/>
+              </a:rPr>
+              <a:t>from the word if and only if the lemma is present in the dictionary</a:t>
+            </a:r>
+            <a:endParaRPr lang="en-US" dirty="0"/>
+          </a:p>
+        </p:txBody>
+      </p:sp>
+      <p:sp>
+        <p:nvSpPr>
+          <p:cNvPr id="4" name="Foliennummernplatzhalter 3"/>
+          <p:cNvSpPr>
+            <a:spLocks noGrp="1"/>
+          </p:cNvSpPr>
+          <p:nvPr>
+            <p:ph type="sldNum" sz="quarter" idx="10"/>
+          </p:nvPr>
+        </p:nvSpPr>
+        <p:spPr/>
+        <p:txBody>
+          <a:bodyPr/>
+          <a:lstStyle/>
+          <a:p>
+            <a:fld id="{20A41429-B750-4047-B563-2878417A70E7}" type="slidenum">
+              <a:rPr lang="en-US" smtClean="0"/>
+              <a:t>14</a:t>
+            </a:fld>
+            <a:endParaRPr lang="en-US"/>
+          </a:p>
+        </p:txBody>
+      </p:sp>
+    </p:spTree>
+    <p:extLst>
+      <p:ext uri="{BB962C8B-B14F-4D97-AF65-F5344CB8AC3E}">
+        <p14:creationId xmlns:p14="http://schemas.microsoft.com/office/powerpoint/2010/main" val="1660201734"/>
       </p:ext>
     </p:extLst>
   </p:cSld>
@@ -3852,7 +4215,19 @@
                   </a:outerShdw>
                 </a:effectLst>
               </a:rPr>
-              <a:t>Scraping &amp; Text Cleaning</a:t>
+              <a:t>Scraping &amp; Text </a:t>
+            </a:r>
+            <a:r>
+              <a:rPr lang="en-US" b="1" dirty="0" smtClean="0">
+                <a:effectLst>
+                  <a:outerShdw blurRad="38100" dist="38100" dir="2700000" algn="tl">
+                    <a:srgbClr val="000000">
+                      <a:alpha val="43137"/>
+                    </a:srgbClr>
+                  </a:outerShdw>
+                </a:effectLst>
+              </a:rPr>
+              <a:t>Normalization</a:t>
             </a:r>
             <a:endParaRPr lang="en-US" b="1" dirty="0">
               <a:effectLst>
@@ -3935,56 +4310,73 @@
           <a:lstStyle/>
           <a:p>
             <a:r>
-              <a:rPr lang="en-US" b="1" dirty="0">
-                <a:effectLst>
-                  <a:outerShdw blurRad="38100" dist="38100" dir="2700000" algn="tl">
-                    <a:srgbClr val="000000">
-                      <a:alpha val="43137"/>
-                    </a:srgbClr>
-                  </a:outerShdw>
-                </a:effectLst>
-              </a:rPr>
-              <a:t>Part II: Scraping &amp; Text Cleaning</a:t>
-            </a:r>
-          </a:p>
-        </p:txBody>
-      </p:sp>
-      <p:sp>
-        <p:nvSpPr>
-          <p:cNvPr id="3" name="Textplatzhalter 2"/>
-          <p:cNvSpPr>
-            <a:spLocks noGrp="1"/>
-          </p:cNvSpPr>
-          <p:nvPr>
-            <p:ph type="body" idx="1"/>
-          </p:nvPr>
-        </p:nvSpPr>
-        <p:spPr/>
+              <a:rPr lang="en-US" dirty="0"/>
+              <a:t>Regular </a:t>
+            </a:r>
+            <a:r>
+              <a:rPr lang="en-US" dirty="0" smtClean="0"/>
+              <a:t>Expressions (</a:t>
+            </a:r>
+            <a:r>
+              <a:rPr lang="en-US" dirty="0" err="1" smtClean="0"/>
+              <a:t>RegEx</a:t>
+            </a:r>
+            <a:r>
+              <a:rPr lang="en-US" dirty="0" smtClean="0"/>
+              <a:t>) - Basics</a:t>
+            </a:r>
+            <a:endParaRPr lang="en-US" dirty="0"/>
+          </a:p>
+        </p:txBody>
+      </p:sp>
+      <p:sp>
+        <p:nvSpPr>
+          <p:cNvPr id="3" name="Inhaltsplatzhalter 2"/>
+          <p:cNvSpPr>
+            <a:spLocks noGrp="1"/>
+          </p:cNvSpPr>
+          <p:nvPr>
+            <p:ph idx="1"/>
+          </p:nvPr>
+        </p:nvSpPr>
+        <p:spPr>
+          <a:xfrm>
+            <a:off x="838200" y="1328323"/>
+            <a:ext cx="10515600" cy="4351338"/>
+          </a:xfrm>
+        </p:spPr>
         <p:txBody>
           <a:bodyPr/>
           <a:lstStyle/>
           <a:p>
             <a:r>
-              <a:rPr lang="en-US" b="1" dirty="0" smtClean="0">
-                <a:effectLst>
-                  <a:outerShdw blurRad="38100" dist="38100" dir="2700000" algn="tl">
-                    <a:srgbClr val="000000">
-                      <a:alpha val="43137"/>
-                    </a:srgbClr>
-                  </a:outerShdw>
-                </a:effectLst>
-              </a:rPr>
-              <a:t>Practical Application</a:t>
-            </a:r>
-            <a:endParaRPr lang="en-US" b="1" dirty="0">
-              <a:effectLst>
-                <a:outerShdw blurRad="38100" dist="38100" dir="2700000" algn="tl">
-                  <a:srgbClr val="000000">
-                    <a:alpha val="43137"/>
-                  </a:srgbClr>
-                </a:outerShdw>
-              </a:effectLst>
-            </a:endParaRPr>
+              <a:rPr lang="en-US" dirty="0" smtClean="0"/>
+              <a:t>Focus of NLP in general: Analysis and understanding of (unstructured) text</a:t>
+            </a:r>
+          </a:p>
+          <a:p>
+            <a:r>
+              <a:rPr lang="en-US" dirty="0" smtClean="0"/>
+              <a:t>Regex: A pattern (sequence of characters) practiced to search text with a common structure</a:t>
+            </a:r>
+          </a:p>
+          <a:p>
+            <a:r>
+              <a:rPr lang="en-US" dirty="0"/>
+              <a:t>U</a:t>
+            </a:r>
+            <a:r>
+              <a:rPr lang="en-US" dirty="0" smtClean="0"/>
+              <a:t>sed for: Searching for a specific file name, finding a tweet with a specific pattern, replacing specific pattern in a text, etc.</a:t>
+            </a:r>
+          </a:p>
+          <a:p>
+            <a:pPr lvl="1"/>
+            <a:endParaRPr lang="en-US" dirty="0" smtClean="0"/>
+          </a:p>
+          <a:p>
+            <a:pPr lvl="1"/>
+            <a:endParaRPr lang="en-US" dirty="0"/>
           </a:p>
         </p:txBody>
       </p:sp>
@@ -4011,10 +4403,587 @@
           </a:p>
         </p:txBody>
       </p:sp>
+      <p:graphicFrame>
+        <p:nvGraphicFramePr>
+          <p:cNvPr id="5" name="Tabelle 4"/>
+          <p:cNvGraphicFramePr>
+            <a:graphicFrameLocks noGrp="1"/>
+          </p:cNvGraphicFramePr>
+          <p:nvPr>
+            <p:extLst>
+              <p:ext uri="{D42A27DB-BD31-4B8C-83A1-F6EECF244321}">
+                <p14:modId xmlns:p14="http://schemas.microsoft.com/office/powerpoint/2010/main" val="1595798176"/>
+              </p:ext>
+            </p:extLst>
+          </p:nvPr>
+        </p:nvGraphicFramePr>
+        <p:xfrm>
+          <a:off x="2142981" y="4089526"/>
+          <a:ext cx="7906038" cy="2743200"/>
+        </p:xfrm>
+        <a:graphic>
+          <a:graphicData uri="http://schemas.openxmlformats.org/drawingml/2006/table">
+            <a:tbl>
+              <a:tblPr firstRow="1" bandRow="1">
+                <a:tableStyleId>{5940675A-B579-460E-94D1-54222C63F5DA}</a:tableStyleId>
+              </a:tblPr>
+              <a:tblGrid>
+                <a:gridCol w="1511350">
+                  <a:extLst>
+                    <a:ext uri="{9D8B030D-6E8A-4147-A177-3AD203B41FA5}">
+                      <a16:colId xmlns:a16="http://schemas.microsoft.com/office/drawing/2014/main" val="1121755169"/>
+                    </a:ext>
+                  </a:extLst>
+                </a:gridCol>
+                <a:gridCol w="3197344">
+                  <a:extLst>
+                    <a:ext uri="{9D8B030D-6E8A-4147-A177-3AD203B41FA5}">
+                      <a16:colId xmlns:a16="http://schemas.microsoft.com/office/drawing/2014/main" val="3255343523"/>
+                    </a:ext>
+                  </a:extLst>
+                </a:gridCol>
+                <a:gridCol w="3197344">
+                  <a:extLst>
+                    <a:ext uri="{9D8B030D-6E8A-4147-A177-3AD203B41FA5}">
+                      <a16:colId xmlns:a16="http://schemas.microsoft.com/office/drawing/2014/main" val="2846526486"/>
+                    </a:ext>
+                  </a:extLst>
+                </a:gridCol>
+              </a:tblGrid>
+              <a:tr h="125637">
+                <a:tc>
+                  <a:txBody>
+                    <a:bodyPr/>
+                    <a:lstStyle/>
+                    <a:p>
+                      <a:endParaRPr lang="en-US" sz="2400" b="1" dirty="0"/>
+                    </a:p>
+                  </a:txBody>
+                  <a:tcPr/>
+                </a:tc>
+                <a:tc>
+                  <a:txBody>
+                    <a:bodyPr/>
+                    <a:lstStyle/>
+                    <a:p>
+                      <a:pPr algn="ctr"/>
+                      <a:r>
+                        <a:rPr lang="en-US" sz="2400" b="1" dirty="0" smtClean="0"/>
+                        <a:t>base</a:t>
+                      </a:r>
+                      <a:endParaRPr lang="en-US" sz="2400" b="1" dirty="0"/>
+                    </a:p>
+                  </a:txBody>
+                  <a:tcPr/>
+                </a:tc>
+                <a:tc>
+                  <a:txBody>
+                    <a:bodyPr/>
+                    <a:lstStyle/>
+                    <a:p>
+                      <a:pPr algn="ctr"/>
+                      <a:r>
+                        <a:rPr lang="en-US" sz="2400" b="1" dirty="0" err="1" smtClean="0"/>
+                        <a:t>stringr</a:t>
+                      </a:r>
+                      <a:endParaRPr lang="en-US" sz="2400" b="1" dirty="0"/>
+                    </a:p>
+                  </a:txBody>
+                  <a:tcPr/>
+                </a:tc>
+                <a:extLst>
+                  <a:ext uri="{0D108BD9-81ED-4DB2-BD59-A6C34878D82A}">
+                    <a16:rowId xmlns:a16="http://schemas.microsoft.com/office/drawing/2014/main" val="3604647407"/>
+                  </a:ext>
+                </a:extLst>
+              </a:tr>
+              <a:tr h="430435">
+                <a:tc>
+                  <a:txBody>
+                    <a:bodyPr/>
+                    <a:lstStyle/>
+                    <a:p>
+                      <a:r>
+                        <a:rPr lang="en-US" sz="2400" b="1" dirty="0" smtClean="0"/>
+                        <a:t>Identify</a:t>
+                      </a:r>
+                      <a:endParaRPr lang="en-US" sz="2400" b="1" dirty="0"/>
+                    </a:p>
+                  </a:txBody>
+                  <a:tcPr/>
+                </a:tc>
+                <a:tc>
+                  <a:txBody>
+                    <a:bodyPr/>
+                    <a:lstStyle/>
+                    <a:p>
+                      <a:r>
+                        <a:rPr lang="en-US" sz="1800" dirty="0" err="1" smtClean="0">
+                          <a:latin typeface="Courier New" panose="02070309020205020404" pitchFamily="49" charset="0"/>
+                          <a:cs typeface="Courier New" panose="02070309020205020404" pitchFamily="49" charset="0"/>
+                        </a:rPr>
+                        <a:t>grep</a:t>
+                      </a:r>
+                      <a:r>
+                        <a:rPr lang="en-US" sz="1800" baseline="0" dirty="0" smtClean="0">
+                          <a:latin typeface="Courier New" panose="02070309020205020404" pitchFamily="49" charset="0"/>
+                          <a:cs typeface="Courier New" panose="02070309020205020404" pitchFamily="49" charset="0"/>
+                        </a:rPr>
+                        <a:t>(., value = FALSE)</a:t>
+                      </a:r>
+                      <a:endParaRPr lang="en-US" sz="1800" dirty="0">
+                        <a:latin typeface="Courier New" panose="02070309020205020404" pitchFamily="49" charset="0"/>
+                        <a:cs typeface="Courier New" panose="02070309020205020404" pitchFamily="49" charset="0"/>
+                      </a:endParaRPr>
+                    </a:p>
+                  </a:txBody>
+                  <a:tcPr/>
+                </a:tc>
+                <a:tc>
+                  <a:txBody>
+                    <a:bodyPr/>
+                    <a:lstStyle/>
+                    <a:p>
+                      <a:r>
+                        <a:rPr lang="en-GB" sz="1800" b="0" i="0" kern="1200" dirty="0" err="1" smtClean="0">
+                          <a:solidFill>
+                            <a:schemeClr val="tx1"/>
+                          </a:solidFill>
+                          <a:effectLst/>
+                          <a:latin typeface="Courier New" panose="02070309020205020404" pitchFamily="49" charset="0"/>
+                          <a:ea typeface="+mn-ea"/>
+                          <a:cs typeface="Courier New" panose="02070309020205020404" pitchFamily="49" charset="0"/>
+                        </a:rPr>
+                        <a:t>str_detect</a:t>
+                      </a:r>
+                      <a:r>
+                        <a:rPr lang="en-GB" sz="1800" b="0" i="0" kern="1200" dirty="0" smtClean="0">
+                          <a:solidFill>
+                            <a:schemeClr val="tx1"/>
+                          </a:solidFill>
+                          <a:effectLst/>
+                          <a:latin typeface="Courier New" panose="02070309020205020404" pitchFamily="49" charset="0"/>
+                          <a:ea typeface="+mn-ea"/>
+                          <a:cs typeface="Courier New" panose="02070309020205020404" pitchFamily="49" charset="0"/>
+                        </a:rPr>
+                        <a:t>()</a:t>
+                      </a:r>
+                      <a:endParaRPr lang="en-US" sz="1800" dirty="0">
+                        <a:latin typeface="Courier New" panose="02070309020205020404" pitchFamily="49" charset="0"/>
+                        <a:cs typeface="Courier New" panose="02070309020205020404" pitchFamily="49" charset="0"/>
+                      </a:endParaRPr>
+                    </a:p>
+                  </a:txBody>
+                  <a:tcPr/>
+                </a:tc>
+                <a:extLst>
+                  <a:ext uri="{0D108BD9-81ED-4DB2-BD59-A6C34878D82A}">
+                    <a16:rowId xmlns:a16="http://schemas.microsoft.com/office/drawing/2014/main" val="1726118439"/>
+                  </a:ext>
+                </a:extLst>
+              </a:tr>
+              <a:tr h="430435">
+                <a:tc>
+                  <a:txBody>
+                    <a:bodyPr/>
+                    <a:lstStyle/>
+                    <a:p>
+                      <a:r>
+                        <a:rPr lang="en-US" sz="2400" b="1" dirty="0" smtClean="0"/>
+                        <a:t>Extract</a:t>
+                      </a:r>
+                      <a:endParaRPr lang="en-US" sz="2400" b="1" dirty="0"/>
+                    </a:p>
+                  </a:txBody>
+                  <a:tcPr/>
+                </a:tc>
+                <a:tc>
+                  <a:txBody>
+                    <a:bodyPr/>
+                    <a:lstStyle/>
+                    <a:p>
+                      <a:pPr marL="0" marR="0" lvl="0" indent="0" algn="l" defTabSz="914400" rtl="0" eaLnBrk="1" fontAlgn="auto" latinLnBrk="0" hangingPunct="1">
+                        <a:lnSpc>
+                          <a:spcPct val="100000"/>
+                        </a:lnSpc>
+                        <a:spcBef>
+                          <a:spcPts val="0"/>
+                        </a:spcBef>
+                        <a:spcAft>
+                          <a:spcPts val="0"/>
+                        </a:spcAft>
+                        <a:buClrTx/>
+                        <a:buSzTx/>
+                        <a:buFontTx/>
+                        <a:buNone/>
+                        <a:tabLst/>
+                        <a:defRPr/>
+                      </a:pPr>
+                      <a:r>
+                        <a:rPr lang="en-US" sz="1800" dirty="0" err="1" smtClean="0">
+                          <a:latin typeface="Courier New" panose="02070309020205020404" pitchFamily="49" charset="0"/>
+                          <a:cs typeface="Courier New" panose="02070309020205020404" pitchFamily="49" charset="0"/>
+                        </a:rPr>
+                        <a:t>grep</a:t>
+                      </a:r>
+                      <a:r>
+                        <a:rPr lang="en-US" sz="1800" baseline="0" dirty="0" smtClean="0">
+                          <a:latin typeface="Courier New" panose="02070309020205020404" pitchFamily="49" charset="0"/>
+                          <a:cs typeface="Courier New" panose="02070309020205020404" pitchFamily="49" charset="0"/>
+                        </a:rPr>
+                        <a:t>(., value = TRUE)</a:t>
+                      </a:r>
+                      <a:endParaRPr lang="en-US" sz="1800" dirty="0" smtClean="0">
+                        <a:latin typeface="Courier New" panose="02070309020205020404" pitchFamily="49" charset="0"/>
+                        <a:cs typeface="Courier New" panose="02070309020205020404" pitchFamily="49" charset="0"/>
+                      </a:endParaRPr>
+                    </a:p>
+                  </a:txBody>
+                  <a:tcPr/>
+                </a:tc>
+                <a:tc>
+                  <a:txBody>
+                    <a:bodyPr/>
+                    <a:lstStyle/>
+                    <a:p>
+                      <a:r>
+                        <a:rPr lang="en-GB" sz="1800" b="0" i="0" kern="1200" dirty="0" err="1" smtClean="0">
+                          <a:solidFill>
+                            <a:schemeClr val="tx1"/>
+                          </a:solidFill>
+                          <a:effectLst/>
+                          <a:latin typeface="Courier New" panose="02070309020205020404" pitchFamily="49" charset="0"/>
+                          <a:ea typeface="+mn-ea"/>
+                          <a:cs typeface="Courier New" panose="02070309020205020404" pitchFamily="49" charset="0"/>
+                        </a:rPr>
+                        <a:t>str_extract</a:t>
+                      </a:r>
+                      <a:r>
+                        <a:rPr lang="en-GB" sz="1800" b="0" i="0" kern="1200" dirty="0" smtClean="0">
+                          <a:solidFill>
+                            <a:schemeClr val="tx1"/>
+                          </a:solidFill>
+                          <a:effectLst/>
+                          <a:latin typeface="Courier New" panose="02070309020205020404" pitchFamily="49" charset="0"/>
+                          <a:ea typeface="+mn-ea"/>
+                          <a:cs typeface="Courier New" panose="02070309020205020404" pitchFamily="49" charset="0"/>
+                        </a:rPr>
+                        <a:t>()</a:t>
+                      </a:r>
+                      <a:endParaRPr lang="en-US" sz="1800" dirty="0">
+                        <a:latin typeface="Courier New" panose="02070309020205020404" pitchFamily="49" charset="0"/>
+                        <a:cs typeface="Courier New" panose="02070309020205020404" pitchFamily="49" charset="0"/>
+                      </a:endParaRPr>
+                    </a:p>
+                  </a:txBody>
+                  <a:tcPr/>
+                </a:tc>
+                <a:extLst>
+                  <a:ext uri="{0D108BD9-81ED-4DB2-BD59-A6C34878D82A}">
+                    <a16:rowId xmlns:a16="http://schemas.microsoft.com/office/drawing/2014/main" val="1294027997"/>
+                  </a:ext>
+                </a:extLst>
+              </a:tr>
+              <a:tr h="430435">
+                <a:tc>
+                  <a:txBody>
+                    <a:bodyPr/>
+                    <a:lstStyle/>
+                    <a:p>
+                      <a:r>
+                        <a:rPr lang="en-US" sz="2400" b="1" dirty="0" smtClean="0"/>
+                        <a:t>Locate</a:t>
+                      </a:r>
+                      <a:endParaRPr lang="en-US" sz="2400" b="1" dirty="0"/>
+                    </a:p>
+                  </a:txBody>
+                  <a:tcPr/>
+                </a:tc>
+                <a:tc>
+                  <a:txBody>
+                    <a:bodyPr/>
+                    <a:lstStyle/>
+                    <a:p>
+                      <a:pPr marL="0" marR="0" lvl="0" indent="0" algn="l" defTabSz="914400" rtl="0" eaLnBrk="1" fontAlgn="auto" latinLnBrk="0" hangingPunct="1">
+                        <a:lnSpc>
+                          <a:spcPct val="100000"/>
+                        </a:lnSpc>
+                        <a:spcBef>
+                          <a:spcPts val="0"/>
+                        </a:spcBef>
+                        <a:spcAft>
+                          <a:spcPts val="0"/>
+                        </a:spcAft>
+                        <a:buClrTx/>
+                        <a:buSzTx/>
+                        <a:buFontTx/>
+                        <a:buNone/>
+                        <a:tabLst/>
+                        <a:defRPr/>
+                      </a:pPr>
+                      <a:r>
+                        <a:rPr lang="en-US" sz="1800" dirty="0" err="1" smtClean="0">
+                          <a:latin typeface="Courier New" panose="02070309020205020404" pitchFamily="49" charset="0"/>
+                          <a:cs typeface="Courier New" panose="02070309020205020404" pitchFamily="49" charset="0"/>
+                        </a:rPr>
+                        <a:t>gregexpr</a:t>
+                      </a:r>
+                      <a:r>
+                        <a:rPr lang="en-US" sz="1800" baseline="0" dirty="0" smtClean="0">
+                          <a:latin typeface="Courier New" panose="02070309020205020404" pitchFamily="49" charset="0"/>
+                          <a:cs typeface="Courier New" panose="02070309020205020404" pitchFamily="49" charset="0"/>
+                        </a:rPr>
+                        <a:t>()</a:t>
+                      </a:r>
+                      <a:endParaRPr lang="en-US" sz="1800" dirty="0" smtClean="0">
+                        <a:latin typeface="Courier New" panose="02070309020205020404" pitchFamily="49" charset="0"/>
+                        <a:cs typeface="Courier New" panose="02070309020205020404" pitchFamily="49" charset="0"/>
+                      </a:endParaRPr>
+                    </a:p>
+                  </a:txBody>
+                  <a:tcPr/>
+                </a:tc>
+                <a:tc>
+                  <a:txBody>
+                    <a:bodyPr/>
+                    <a:lstStyle/>
+                    <a:p>
+                      <a:r>
+                        <a:rPr lang="en-GB" sz="1800" b="0" i="0" kern="1200" dirty="0" err="1" smtClean="0">
+                          <a:solidFill>
+                            <a:schemeClr val="tx1"/>
+                          </a:solidFill>
+                          <a:effectLst/>
+                          <a:latin typeface="Courier New" panose="02070309020205020404" pitchFamily="49" charset="0"/>
+                          <a:ea typeface="+mn-ea"/>
+                          <a:cs typeface="Courier New" panose="02070309020205020404" pitchFamily="49" charset="0"/>
+                        </a:rPr>
+                        <a:t>str_locate</a:t>
+                      </a:r>
+                      <a:r>
+                        <a:rPr lang="en-GB" sz="1800" b="0" i="0" kern="1200" dirty="0" smtClean="0">
+                          <a:solidFill>
+                            <a:schemeClr val="tx1"/>
+                          </a:solidFill>
+                          <a:effectLst/>
+                          <a:latin typeface="Courier New" panose="02070309020205020404" pitchFamily="49" charset="0"/>
+                          <a:ea typeface="+mn-ea"/>
+                          <a:cs typeface="Courier New" panose="02070309020205020404" pitchFamily="49" charset="0"/>
+                        </a:rPr>
+                        <a:t>()</a:t>
+                      </a:r>
+                      <a:endParaRPr lang="en-US" sz="1800" dirty="0">
+                        <a:latin typeface="Courier New" panose="02070309020205020404" pitchFamily="49" charset="0"/>
+                        <a:cs typeface="Courier New" panose="02070309020205020404" pitchFamily="49" charset="0"/>
+                      </a:endParaRPr>
+                    </a:p>
+                  </a:txBody>
+                  <a:tcPr/>
+                </a:tc>
+                <a:extLst>
+                  <a:ext uri="{0D108BD9-81ED-4DB2-BD59-A6C34878D82A}">
+                    <a16:rowId xmlns:a16="http://schemas.microsoft.com/office/drawing/2014/main" val="427721822"/>
+                  </a:ext>
+                </a:extLst>
+              </a:tr>
+              <a:tr h="430435">
+                <a:tc>
+                  <a:txBody>
+                    <a:bodyPr/>
+                    <a:lstStyle/>
+                    <a:p>
+                      <a:r>
+                        <a:rPr lang="en-US" sz="2400" b="1" dirty="0" smtClean="0"/>
+                        <a:t>Replace</a:t>
+                      </a:r>
+                      <a:endParaRPr lang="en-US" sz="2400" b="1" dirty="0"/>
+                    </a:p>
+                  </a:txBody>
+                  <a:tcPr/>
+                </a:tc>
+                <a:tc>
+                  <a:txBody>
+                    <a:bodyPr/>
+                    <a:lstStyle/>
+                    <a:p>
+                      <a:r>
+                        <a:rPr lang="en-GB" sz="1800" b="0" i="0" kern="1200" dirty="0" err="1" smtClean="0">
+                          <a:solidFill>
+                            <a:schemeClr val="tx1"/>
+                          </a:solidFill>
+                          <a:effectLst/>
+                          <a:latin typeface="Courier New" panose="02070309020205020404" pitchFamily="49" charset="0"/>
+                          <a:ea typeface="+mn-ea"/>
+                          <a:cs typeface="Courier New" panose="02070309020205020404" pitchFamily="49" charset="0"/>
+                        </a:rPr>
+                        <a:t>gsub</a:t>
+                      </a:r>
+                      <a:r>
+                        <a:rPr lang="en-GB" sz="1800" b="0" i="0" kern="1200" dirty="0" smtClean="0">
+                          <a:solidFill>
+                            <a:schemeClr val="tx1"/>
+                          </a:solidFill>
+                          <a:effectLst/>
+                          <a:latin typeface="Courier New" panose="02070309020205020404" pitchFamily="49" charset="0"/>
+                          <a:ea typeface="+mn-ea"/>
+                          <a:cs typeface="Courier New" panose="02070309020205020404" pitchFamily="49" charset="0"/>
+                        </a:rPr>
+                        <a:t>()</a:t>
+                      </a:r>
+                      <a:endParaRPr lang="en-US" sz="1800" dirty="0">
+                        <a:latin typeface="Courier New" panose="02070309020205020404" pitchFamily="49" charset="0"/>
+                        <a:cs typeface="Courier New" panose="02070309020205020404" pitchFamily="49" charset="0"/>
+                      </a:endParaRPr>
+                    </a:p>
+                  </a:txBody>
+                  <a:tcPr/>
+                </a:tc>
+                <a:tc>
+                  <a:txBody>
+                    <a:bodyPr/>
+                    <a:lstStyle/>
+                    <a:p>
+                      <a:r>
+                        <a:rPr lang="en-GB" sz="1800" b="0" i="0" kern="1200" dirty="0" err="1" smtClean="0">
+                          <a:solidFill>
+                            <a:schemeClr val="tx1"/>
+                          </a:solidFill>
+                          <a:effectLst/>
+                          <a:latin typeface="Courier New" panose="02070309020205020404" pitchFamily="49" charset="0"/>
+                          <a:ea typeface="+mn-ea"/>
+                          <a:cs typeface="Courier New" panose="02070309020205020404" pitchFamily="49" charset="0"/>
+                        </a:rPr>
+                        <a:t>str_replace</a:t>
+                      </a:r>
+                      <a:r>
+                        <a:rPr lang="en-GB" sz="1800" b="0" i="0" kern="1200" dirty="0" smtClean="0">
+                          <a:solidFill>
+                            <a:schemeClr val="tx1"/>
+                          </a:solidFill>
+                          <a:effectLst/>
+                          <a:latin typeface="Courier New" panose="02070309020205020404" pitchFamily="49" charset="0"/>
+                          <a:ea typeface="+mn-ea"/>
+                          <a:cs typeface="Courier New" panose="02070309020205020404" pitchFamily="49" charset="0"/>
+                        </a:rPr>
+                        <a:t>()</a:t>
+                      </a:r>
+                      <a:endParaRPr lang="en-US" sz="1800" dirty="0">
+                        <a:latin typeface="Courier New" panose="02070309020205020404" pitchFamily="49" charset="0"/>
+                        <a:cs typeface="Courier New" panose="02070309020205020404" pitchFamily="49" charset="0"/>
+                      </a:endParaRPr>
+                    </a:p>
+                  </a:txBody>
+                  <a:tcPr/>
+                </a:tc>
+                <a:extLst>
+                  <a:ext uri="{0D108BD9-81ED-4DB2-BD59-A6C34878D82A}">
+                    <a16:rowId xmlns:a16="http://schemas.microsoft.com/office/drawing/2014/main" val="3626129505"/>
+                  </a:ext>
+                </a:extLst>
+              </a:tr>
+              <a:tr h="430435">
+                <a:tc>
+                  <a:txBody>
+                    <a:bodyPr/>
+                    <a:lstStyle/>
+                    <a:p>
+                      <a:r>
+                        <a:rPr lang="en-US" sz="2400" b="1" dirty="0" smtClean="0"/>
+                        <a:t>Split </a:t>
+                      </a:r>
+                      <a:endParaRPr lang="en-US" sz="2400" b="1" dirty="0"/>
+                    </a:p>
+                  </a:txBody>
+                  <a:tcPr/>
+                </a:tc>
+                <a:tc>
+                  <a:txBody>
+                    <a:bodyPr/>
+                    <a:lstStyle/>
+                    <a:p>
+                      <a:r>
+                        <a:rPr lang="en-GB" sz="1800" b="0" i="0" kern="1200" dirty="0" err="1" smtClean="0">
+                          <a:solidFill>
+                            <a:schemeClr val="tx1"/>
+                          </a:solidFill>
+                          <a:effectLst/>
+                          <a:latin typeface="Courier New" panose="02070309020205020404" pitchFamily="49" charset="0"/>
+                          <a:ea typeface="+mn-ea"/>
+                          <a:cs typeface="Courier New" panose="02070309020205020404" pitchFamily="49" charset="0"/>
+                        </a:rPr>
+                        <a:t>strsplit</a:t>
+                      </a:r>
+                      <a:r>
+                        <a:rPr lang="en-GB" sz="1800" b="0" i="0" kern="1200" dirty="0" smtClean="0">
+                          <a:solidFill>
+                            <a:schemeClr val="tx1"/>
+                          </a:solidFill>
+                          <a:effectLst/>
+                          <a:latin typeface="Courier New" panose="02070309020205020404" pitchFamily="49" charset="0"/>
+                          <a:ea typeface="+mn-ea"/>
+                          <a:cs typeface="Courier New" panose="02070309020205020404" pitchFamily="49" charset="0"/>
+                        </a:rPr>
+                        <a:t>()</a:t>
+                      </a:r>
+                      <a:endParaRPr lang="en-US" sz="1800" dirty="0">
+                        <a:latin typeface="Courier New" panose="02070309020205020404" pitchFamily="49" charset="0"/>
+                        <a:cs typeface="Courier New" panose="02070309020205020404" pitchFamily="49" charset="0"/>
+                      </a:endParaRPr>
+                    </a:p>
+                  </a:txBody>
+                  <a:tcPr/>
+                </a:tc>
+                <a:tc>
+                  <a:txBody>
+                    <a:bodyPr/>
+                    <a:lstStyle/>
+                    <a:p>
+                      <a:r>
+                        <a:rPr lang="en-GB" sz="1800" b="0" i="0" kern="1200" dirty="0" err="1" smtClean="0">
+                          <a:solidFill>
+                            <a:schemeClr val="tx1"/>
+                          </a:solidFill>
+                          <a:effectLst/>
+                          <a:latin typeface="Courier New" panose="02070309020205020404" pitchFamily="49" charset="0"/>
+                          <a:ea typeface="+mn-ea"/>
+                          <a:cs typeface="Courier New" panose="02070309020205020404" pitchFamily="49" charset="0"/>
+                        </a:rPr>
+                        <a:t>str_split</a:t>
+                      </a:r>
+                      <a:r>
+                        <a:rPr lang="en-GB" sz="1800" b="0" i="0" kern="1200" dirty="0" smtClean="0">
+                          <a:solidFill>
+                            <a:schemeClr val="tx1"/>
+                          </a:solidFill>
+                          <a:effectLst/>
+                          <a:latin typeface="Courier New" panose="02070309020205020404" pitchFamily="49" charset="0"/>
+                          <a:ea typeface="+mn-ea"/>
+                          <a:cs typeface="Courier New" panose="02070309020205020404" pitchFamily="49" charset="0"/>
+                        </a:rPr>
+                        <a:t>()</a:t>
+                      </a:r>
+                      <a:endParaRPr lang="en-US" sz="1800" dirty="0">
+                        <a:latin typeface="Courier New" panose="02070309020205020404" pitchFamily="49" charset="0"/>
+                        <a:cs typeface="Courier New" panose="02070309020205020404" pitchFamily="49" charset="0"/>
+                      </a:endParaRPr>
+                    </a:p>
+                  </a:txBody>
+                  <a:tcPr/>
+                </a:tc>
+                <a:extLst>
+                  <a:ext uri="{0D108BD9-81ED-4DB2-BD59-A6C34878D82A}">
+                    <a16:rowId xmlns:a16="http://schemas.microsoft.com/office/drawing/2014/main" val="2605753601"/>
+                  </a:ext>
+                </a:extLst>
+              </a:tr>
+            </a:tbl>
+          </a:graphicData>
+        </a:graphic>
+      </p:graphicFrame>
     </p:spTree>
     <p:extLst>
       <p:ext uri="{BB962C8B-B14F-4D97-AF65-F5344CB8AC3E}">
-        <p14:creationId xmlns:p14="http://schemas.microsoft.com/office/powerpoint/2010/main" val="870340316"/>
+        <p14:creationId xmlns:p14="http://schemas.microsoft.com/office/powerpoint/2010/main" val="3203263655"/>
       </p:ext>
     </p:extLst>
   </p:cSld>
@@ -4043,195 +5012,35 @@
       </p:grpSpPr>
       <p:sp>
         <p:nvSpPr>
-          <p:cNvPr id="3" name="Inhaltsplatzhalter 2"/>
-          <p:cNvSpPr>
-            <a:spLocks noGrp="1"/>
-          </p:cNvSpPr>
-          <p:nvPr>
-            <p:ph idx="1"/>
-          </p:nvPr>
-        </p:nvSpPr>
-        <p:spPr>
-          <a:xfrm>
-            <a:off x="838200" y="385011"/>
-            <a:ext cx="10515600" cy="5791952"/>
-          </a:xfrm>
-        </p:spPr>
-        <p:txBody>
-          <a:bodyPr>
-            <a:normAutofit/>
-          </a:bodyPr>
-          <a:lstStyle/>
-          <a:p>
-            <a:pPr marL="0" indent="0">
-              <a:buNone/>
-            </a:pPr>
-            <a:r>
-              <a:rPr lang="en-US" b="1" u="sng" dirty="0" smtClean="0"/>
-              <a:t>Preparation</a:t>
+          <p:cNvPr id="2" name="Titel 1"/>
+          <p:cNvSpPr>
+            <a:spLocks noGrp="1"/>
+          </p:cNvSpPr>
+          <p:nvPr>
+            <p:ph type="title"/>
+          </p:nvPr>
+        </p:nvSpPr>
+        <p:spPr/>
+        <p:txBody>
+          <a:bodyPr/>
+          <a:lstStyle/>
+          <a:p>
+            <a:r>
+              <a:rPr lang="en-US" dirty="0" err="1" smtClean="0"/>
+              <a:t>RegEx</a:t>
+            </a:r>
+            <a:r>
+              <a:rPr lang="en-US" dirty="0"/>
+              <a:t> - </a:t>
             </a:r>
             <a:r>
               <a:rPr lang="en-US" dirty="0" smtClean="0"/>
-              <a:t>: </a:t>
-            </a:r>
-          </a:p>
-          <a:p>
-            <a:pPr marL="914400" lvl="1" indent="-457200">
-              <a:buFont typeface="+mj-lt"/>
-              <a:buAutoNum type="arabicParenR"/>
-            </a:pPr>
-            <a:r>
-              <a:rPr lang="en-US" dirty="0" smtClean="0"/>
-              <a:t>Get an access to Google Collab</a:t>
-            </a:r>
-          </a:p>
-          <a:p>
-            <a:pPr marL="914400" lvl="1" indent="-457200">
-              <a:buFont typeface="+mj-lt"/>
-              <a:buAutoNum type="arabicParenR"/>
-            </a:pPr>
-            <a:r>
-              <a:rPr lang="en-US" dirty="0" smtClean="0"/>
-              <a:t>Open </a:t>
-            </a:r>
-            <a:r>
-              <a:rPr lang="en-US" dirty="0" err="1" smtClean="0"/>
-              <a:t>Jupyter</a:t>
-            </a:r>
-            <a:r>
-              <a:rPr lang="en-US" dirty="0" smtClean="0"/>
-              <a:t> </a:t>
+              <a:t>Useful </a:t>
             </a:r>
             <a:r>
               <a:rPr lang="en-US" dirty="0"/>
-              <a:t>Notebook: </a:t>
-            </a:r>
-            <a:r>
-              <a:rPr lang="en-US" dirty="0" err="1"/>
-              <a:t>Tutorial_Scraping.ipynb</a:t>
-            </a:r>
-            <a:endParaRPr lang="en-US" dirty="0" smtClean="0"/>
-          </a:p>
-          <a:p>
-            <a:pPr marL="914400" lvl="1" indent="-457200">
-              <a:buFont typeface="+mj-lt"/>
-              <a:buAutoNum type="arabicParenR"/>
-            </a:pPr>
-            <a:r>
-              <a:rPr lang="en-US" dirty="0" smtClean="0"/>
-              <a:t>Set </a:t>
-            </a:r>
-            <a:r>
-              <a:rPr lang="en-US" smtClean="0"/>
-              <a:t>up R</a:t>
-            </a:r>
-            <a:endParaRPr lang="en-US" dirty="0" smtClean="0"/>
-          </a:p>
-          <a:p>
-            <a:endParaRPr lang="en-US" dirty="0"/>
-          </a:p>
-          <a:p>
-            <a:pPr marL="0" indent="0">
-              <a:buNone/>
-            </a:pPr>
-            <a:r>
-              <a:rPr lang="en-US" b="1" u="sng" dirty="0" smtClean="0"/>
-              <a:t>Exercises:</a:t>
-            </a:r>
-          </a:p>
-          <a:p>
-            <a:pPr marL="971550" lvl="1" indent="-514350">
-              <a:buFont typeface="Arial" panose="020B0604020202020204" pitchFamily="34" charset="0"/>
-              <a:buAutoNum type="arabicParenR"/>
-            </a:pPr>
-            <a:r>
-              <a:rPr lang="en-US" dirty="0" smtClean="0"/>
-              <a:t>Web Scraping: Extract the Titles and Texts from the following webpage and save in a </a:t>
-            </a:r>
-            <a:r>
-              <a:rPr lang="en-US" dirty="0"/>
-              <a:t>data frame: https://practicewebscrapingsite.wordpress.com/example-1</a:t>
-            </a:r>
-            <a:endParaRPr lang="en-US" dirty="0" smtClean="0"/>
-          </a:p>
-          <a:p>
-            <a:pPr marL="971550" lvl="1" indent="-514350">
-              <a:buFont typeface="Arial" panose="020B0604020202020204" pitchFamily="34" charset="0"/>
-              <a:buAutoNum type="arabicParenR"/>
-            </a:pPr>
-            <a:r>
-              <a:rPr lang="en-US" dirty="0" smtClean="0"/>
-              <a:t>Twitter Scraping: </a:t>
-            </a:r>
-          </a:p>
-          <a:p>
-            <a:pPr marL="1428750" lvl="2" indent="-514350">
-              <a:buFont typeface="Arial" panose="020B0604020202020204" pitchFamily="34" charset="0"/>
-              <a:buAutoNum type="arabicParenR"/>
-            </a:pPr>
-            <a:r>
-              <a:rPr lang="en-US" dirty="0" smtClean="0"/>
-              <a:t>Scrape 500 tweets with hashtag “</a:t>
-            </a:r>
-            <a:r>
-              <a:rPr lang="en-US" dirty="0" err="1" smtClean="0"/>
-              <a:t>covid</a:t>
-            </a:r>
-            <a:r>
-              <a:rPr lang="en-US" dirty="0" smtClean="0"/>
-              <a:t>” (exclude retweets)</a:t>
-            </a:r>
-          </a:p>
-          <a:p>
-            <a:pPr marL="1428750" lvl="2" indent="-514350">
-              <a:buFont typeface="Arial" panose="020B0604020202020204" pitchFamily="34" charset="0"/>
-              <a:buAutoNum type="arabicParenR"/>
-            </a:pPr>
-            <a:r>
-              <a:rPr lang="en-US" dirty="0" smtClean="0"/>
-              <a:t>Visualize the timeline by hours and by minutes. Which one is more appropriate?</a:t>
-            </a:r>
-          </a:p>
-          <a:p>
-            <a:pPr marL="1428750" lvl="2" indent="-514350">
-              <a:buFont typeface="Arial" panose="020B0604020202020204" pitchFamily="34" charset="0"/>
-              <a:buAutoNum type="arabicParenR"/>
-            </a:pPr>
-            <a:r>
-              <a:rPr lang="en-US" dirty="0" smtClean="0"/>
-              <a:t>Print the most retweeted tweet.</a:t>
-            </a:r>
-          </a:p>
-          <a:p>
-            <a:pPr marL="1428750" lvl="2" indent="-514350">
-              <a:buFont typeface="Arial" panose="020B0604020202020204" pitchFamily="34" charset="0"/>
-              <a:buAutoNum type="arabicParenR"/>
-            </a:pPr>
-            <a:endParaRPr lang="en-US" dirty="0" smtClean="0"/>
-          </a:p>
-          <a:p>
-            <a:pPr marL="457200" lvl="1" indent="0">
-              <a:buNone/>
-            </a:pPr>
-            <a:endParaRPr lang="en-US" dirty="0" smtClean="0"/>
-          </a:p>
-          <a:p>
-            <a:pPr marL="0" indent="0">
-              <a:buNone/>
-            </a:pPr>
-            <a:endParaRPr lang="en-US" dirty="0" smtClean="0"/>
-          </a:p>
-          <a:p>
-            <a:pPr marL="514350" indent="-514350">
-              <a:buAutoNum type="arabicParenR"/>
-            </a:pPr>
-            <a:endParaRPr lang="en-US" dirty="0" smtClean="0"/>
-          </a:p>
-          <a:p>
-            <a:pPr marL="514350" indent="-514350">
-              <a:buAutoNum type="arabicParenR"/>
-            </a:pPr>
-            <a:endParaRPr lang="en-US" dirty="0" smtClean="0"/>
+              <a:t>special patterns</a:t>
+            </a:r>
           </a:p>
         </p:txBody>
       </p:sp>
@@ -4258,10 +5067,842 @@
           </a:p>
         </p:txBody>
       </p:sp>
+      <p:graphicFrame>
+        <p:nvGraphicFramePr>
+          <p:cNvPr id="5" name="Tabelle 4"/>
+          <p:cNvGraphicFramePr>
+            <a:graphicFrameLocks noGrp="1"/>
+          </p:cNvGraphicFramePr>
+          <p:nvPr>
+            <p:extLst>
+              <p:ext uri="{D42A27DB-BD31-4B8C-83A1-F6EECF244321}">
+                <p14:modId xmlns:p14="http://schemas.microsoft.com/office/powerpoint/2010/main" val="856276185"/>
+              </p:ext>
+            </p:extLst>
+          </p:nvPr>
+        </p:nvGraphicFramePr>
+        <p:xfrm>
+          <a:off x="64168" y="1418590"/>
+          <a:ext cx="12063663" cy="4572000"/>
+        </p:xfrm>
+        <a:graphic>
+          <a:graphicData uri="http://schemas.openxmlformats.org/drawingml/2006/table">
+            <a:tbl>
+              <a:tblPr firstRow="1" bandRow="1">
+                <a:tableStyleId>{5940675A-B579-460E-94D1-54222C63F5DA}</a:tableStyleId>
+              </a:tblPr>
+              <a:tblGrid>
+                <a:gridCol w="2775285">
+                  <a:extLst>
+                    <a:ext uri="{9D8B030D-6E8A-4147-A177-3AD203B41FA5}">
+                      <a16:colId xmlns:a16="http://schemas.microsoft.com/office/drawing/2014/main" val="1121755169"/>
+                    </a:ext>
+                  </a:extLst>
+                </a:gridCol>
+                <a:gridCol w="9288378">
+                  <a:extLst>
+                    <a:ext uri="{9D8B030D-6E8A-4147-A177-3AD203B41FA5}">
+                      <a16:colId xmlns:a16="http://schemas.microsoft.com/office/drawing/2014/main" val="3255343523"/>
+                    </a:ext>
+                  </a:extLst>
+                </a:gridCol>
+              </a:tblGrid>
+              <a:tr h="215358">
+                <a:tc>
+                  <a:txBody>
+                    <a:bodyPr/>
+                    <a:lstStyle/>
+                    <a:p>
+                      <a:r>
+                        <a:rPr lang="en-US" sz="2400" b="1" dirty="0" smtClean="0"/>
+                        <a:t>Pattern</a:t>
+                      </a:r>
+                      <a:endParaRPr lang="en-US" sz="2400" b="1" dirty="0"/>
+                    </a:p>
+                  </a:txBody>
+                  <a:tcPr>
+                    <a:solidFill>
+                      <a:schemeClr val="bg1">
+                        <a:lumMod val="85000"/>
+                      </a:schemeClr>
+                    </a:solidFill>
+                  </a:tcPr>
+                </a:tc>
+                <a:tc>
+                  <a:txBody>
+                    <a:bodyPr/>
+                    <a:lstStyle/>
+                    <a:p>
+                      <a:pPr algn="l"/>
+                      <a:r>
+                        <a:rPr lang="en-US" sz="2400" b="1" dirty="0" smtClean="0"/>
+                        <a:t>Function</a:t>
+                      </a:r>
+                      <a:endParaRPr lang="en-US" sz="2400" b="1" dirty="0"/>
+                    </a:p>
+                  </a:txBody>
+                  <a:tcPr/>
+                </a:tc>
+                <a:extLst>
+                  <a:ext uri="{0D108BD9-81ED-4DB2-BD59-A6C34878D82A}">
+                    <a16:rowId xmlns:a16="http://schemas.microsoft.com/office/drawing/2014/main" val="3604647407"/>
+                  </a:ext>
+                </a:extLst>
+              </a:tr>
+              <a:tr h="430435">
+                <a:tc>
+                  <a:txBody>
+                    <a:bodyPr/>
+                    <a:lstStyle/>
+                    <a:p>
+                      <a:r>
+                        <a:rPr lang="en-US" sz="2400" b="0" kern="1200" dirty="0" smtClean="0">
+                          <a:solidFill>
+                            <a:schemeClr val="tx1"/>
+                          </a:solidFill>
+                          <a:latin typeface="+mn-lt"/>
+                          <a:ea typeface="+mn-ea"/>
+                          <a:cs typeface="+mn-cs"/>
+                        </a:rPr>
+                        <a:t>\d or [:digit:] or [0-9]</a:t>
+                      </a:r>
+                      <a:endParaRPr lang="en-US" sz="2400" b="0" kern="1200" dirty="0">
+                        <a:solidFill>
+                          <a:schemeClr val="tx1"/>
+                        </a:solidFill>
+                        <a:latin typeface="+mn-lt"/>
+                        <a:ea typeface="+mn-ea"/>
+                        <a:cs typeface="+mn-cs"/>
+                      </a:endParaRPr>
+                    </a:p>
+                  </a:txBody>
+                  <a:tcPr>
+                    <a:solidFill>
+                      <a:schemeClr val="bg1">
+                        <a:lumMod val="85000"/>
+                      </a:schemeClr>
+                    </a:solidFill>
+                  </a:tcPr>
+                </a:tc>
+                <a:tc>
+                  <a:txBody>
+                    <a:bodyPr/>
+                    <a:lstStyle/>
+                    <a:p>
+                      <a:r>
+                        <a:rPr lang="en-US" sz="2400" b="0" kern="1200" dirty="0" smtClean="0">
+                          <a:solidFill>
+                            <a:schemeClr val="tx1"/>
+                          </a:solidFill>
+                          <a:latin typeface="+mn-lt"/>
+                          <a:ea typeface="+mn-ea"/>
+                          <a:cs typeface="+mn-cs"/>
+                        </a:rPr>
+                        <a:t>Matches any digit</a:t>
+                      </a:r>
+                      <a:endParaRPr lang="en-US" sz="2400" b="0" kern="1200" dirty="0">
+                        <a:solidFill>
+                          <a:schemeClr val="tx1"/>
+                        </a:solidFill>
+                        <a:latin typeface="+mn-lt"/>
+                        <a:ea typeface="+mn-ea"/>
+                        <a:cs typeface="+mn-cs"/>
+                      </a:endParaRPr>
+                    </a:p>
+                  </a:txBody>
+                  <a:tcPr/>
+                </a:tc>
+                <a:extLst>
+                  <a:ext uri="{0D108BD9-81ED-4DB2-BD59-A6C34878D82A}">
+                    <a16:rowId xmlns:a16="http://schemas.microsoft.com/office/drawing/2014/main" val="1726118439"/>
+                  </a:ext>
+                </a:extLst>
+              </a:tr>
+              <a:tr h="430435">
+                <a:tc>
+                  <a:txBody>
+                    <a:bodyPr/>
+                    <a:lstStyle/>
+                    <a:p>
+                      <a:pPr marL="0" marR="0" lvl="0" indent="0" algn="l" defTabSz="914400" rtl="0" eaLnBrk="1" fontAlgn="auto" latinLnBrk="0" hangingPunct="1">
+                        <a:lnSpc>
+                          <a:spcPct val="100000"/>
+                        </a:lnSpc>
+                        <a:spcBef>
+                          <a:spcPts val="0"/>
+                        </a:spcBef>
+                        <a:spcAft>
+                          <a:spcPts val="0"/>
+                        </a:spcAft>
+                        <a:buClrTx/>
+                        <a:buSzTx/>
+                        <a:buFontTx/>
+                        <a:buNone/>
+                        <a:tabLst/>
+                        <a:defRPr/>
+                      </a:pPr>
+                      <a:r>
+                        <a:rPr lang="en-GB" sz="2400" b="0" kern="1200" dirty="0" smtClean="0">
+                          <a:solidFill>
+                            <a:schemeClr val="tx1"/>
+                          </a:solidFill>
+                          <a:latin typeface="+mn-lt"/>
+                          <a:ea typeface="+mn-ea"/>
+                          <a:cs typeface="+mn-cs"/>
+                        </a:rPr>
+                        <a:t>[a-z] or [:lower:]</a:t>
+                      </a:r>
+                      <a:endParaRPr lang="en-US" sz="2400" b="0" kern="1200" dirty="0" smtClean="0">
+                        <a:solidFill>
+                          <a:schemeClr val="tx1"/>
+                        </a:solidFill>
+                        <a:latin typeface="+mn-lt"/>
+                        <a:ea typeface="+mn-ea"/>
+                        <a:cs typeface="+mn-cs"/>
+                      </a:endParaRPr>
+                    </a:p>
+                  </a:txBody>
+                  <a:tcPr>
+                    <a:solidFill>
+                      <a:schemeClr val="bg1">
+                        <a:lumMod val="85000"/>
+                      </a:schemeClr>
+                    </a:solidFill>
+                  </a:tcPr>
+                </a:tc>
+                <a:tc>
+                  <a:txBody>
+                    <a:bodyPr/>
+                    <a:lstStyle/>
+                    <a:p>
+                      <a:r>
+                        <a:rPr lang="en-US" sz="2400" b="0" kern="1200" dirty="0" smtClean="0">
+                          <a:solidFill>
+                            <a:schemeClr val="tx1"/>
+                          </a:solidFill>
+                          <a:latin typeface="+mn-lt"/>
+                          <a:ea typeface="+mn-ea"/>
+                          <a:cs typeface="+mn-cs"/>
+                        </a:rPr>
+                        <a:t>Matches any whitespace</a:t>
+                      </a:r>
+                      <a:endParaRPr lang="en-US" sz="2400" b="0" kern="1200" dirty="0">
+                        <a:solidFill>
+                          <a:schemeClr val="tx1"/>
+                        </a:solidFill>
+                        <a:latin typeface="+mn-lt"/>
+                        <a:ea typeface="+mn-ea"/>
+                        <a:cs typeface="+mn-cs"/>
+                      </a:endParaRPr>
+                    </a:p>
+                  </a:txBody>
+                  <a:tcPr/>
+                </a:tc>
+                <a:extLst>
+                  <a:ext uri="{0D108BD9-81ED-4DB2-BD59-A6C34878D82A}">
+                    <a16:rowId xmlns:a16="http://schemas.microsoft.com/office/drawing/2014/main" val="1294027997"/>
+                  </a:ext>
+                </a:extLst>
+              </a:tr>
+              <a:tr h="430435">
+                <a:tc>
+                  <a:txBody>
+                    <a:bodyPr/>
+                    <a:lstStyle/>
+                    <a:p>
+                      <a:r>
+                        <a:rPr lang="en-GB" sz="2400" b="0" kern="1200" dirty="0" smtClean="0">
+                          <a:solidFill>
+                            <a:schemeClr val="tx1"/>
+                          </a:solidFill>
+                          <a:latin typeface="+mn-lt"/>
+                          <a:ea typeface="+mn-ea"/>
+                          <a:cs typeface="+mn-cs"/>
+                        </a:rPr>
+                        <a:t>[A-Z] or [:upper:]</a:t>
+                      </a:r>
+                      <a:endParaRPr lang="en-US" sz="2400" b="0" kern="1200" dirty="0">
+                        <a:solidFill>
+                          <a:schemeClr val="tx1"/>
+                        </a:solidFill>
+                        <a:latin typeface="+mn-lt"/>
+                        <a:ea typeface="+mn-ea"/>
+                        <a:cs typeface="+mn-cs"/>
+                      </a:endParaRPr>
+                    </a:p>
+                  </a:txBody>
+                  <a:tcPr>
+                    <a:solidFill>
+                      <a:schemeClr val="bg1">
+                        <a:lumMod val="85000"/>
+                      </a:schemeClr>
+                    </a:solidFill>
+                  </a:tcPr>
+                </a:tc>
+                <a:tc>
+                  <a:txBody>
+                    <a:bodyPr/>
+                    <a:lstStyle/>
+                    <a:p>
+                      <a:pPr marL="0" marR="0" lvl="0" indent="0" algn="l" defTabSz="914400" rtl="0" eaLnBrk="1" fontAlgn="auto" latinLnBrk="0" hangingPunct="1">
+                        <a:lnSpc>
+                          <a:spcPct val="100000"/>
+                        </a:lnSpc>
+                        <a:spcBef>
+                          <a:spcPts val="0"/>
+                        </a:spcBef>
+                        <a:spcAft>
+                          <a:spcPts val="0"/>
+                        </a:spcAft>
+                        <a:buClrTx/>
+                        <a:buSzTx/>
+                        <a:buFontTx/>
+                        <a:buNone/>
+                        <a:tabLst/>
+                        <a:defRPr/>
+                      </a:pPr>
+                      <a:r>
+                        <a:rPr lang="en-US" sz="2400" b="0" kern="1200" dirty="0" smtClean="0">
+                          <a:solidFill>
+                            <a:schemeClr val="tx1"/>
+                          </a:solidFill>
+                          <a:latin typeface="+mn-lt"/>
+                          <a:ea typeface="+mn-ea"/>
+                          <a:cs typeface="+mn-cs"/>
+                        </a:rPr>
+                        <a:t>Matches any alphanumeric</a:t>
+                      </a:r>
+                    </a:p>
+                  </a:txBody>
+                  <a:tcPr/>
+                </a:tc>
+                <a:extLst>
+                  <a:ext uri="{0D108BD9-81ED-4DB2-BD59-A6C34878D82A}">
+                    <a16:rowId xmlns:a16="http://schemas.microsoft.com/office/drawing/2014/main" val="427721822"/>
+                  </a:ext>
+                </a:extLst>
+              </a:tr>
+              <a:tr h="430435">
+                <a:tc>
+                  <a:txBody>
+                    <a:bodyPr/>
+                    <a:lstStyle/>
+                    <a:p>
+                      <a:r>
+                        <a:rPr lang="en-GB" sz="2400" b="0" kern="1200" dirty="0" smtClean="0">
+                          <a:solidFill>
+                            <a:schemeClr val="tx1"/>
+                          </a:solidFill>
+                          <a:latin typeface="+mn-lt"/>
+                          <a:ea typeface="+mn-ea"/>
+                          <a:cs typeface="+mn-cs"/>
+                        </a:rPr>
+                        <a:t>[</a:t>
+                      </a:r>
+                      <a:r>
+                        <a:rPr lang="en-GB" sz="2400" b="0" kern="1200" dirty="0" err="1" smtClean="0">
+                          <a:solidFill>
+                            <a:schemeClr val="tx1"/>
+                          </a:solidFill>
+                          <a:latin typeface="+mn-lt"/>
+                          <a:ea typeface="+mn-ea"/>
+                          <a:cs typeface="+mn-cs"/>
+                        </a:rPr>
+                        <a:t>abc</a:t>
+                      </a:r>
+                      <a:r>
+                        <a:rPr lang="en-GB" sz="2400" b="0" kern="1200" dirty="0" smtClean="0">
+                          <a:solidFill>
+                            <a:schemeClr val="tx1"/>
+                          </a:solidFill>
+                          <a:latin typeface="+mn-lt"/>
+                          <a:ea typeface="+mn-ea"/>
+                          <a:cs typeface="+mn-cs"/>
+                        </a:rPr>
+                        <a:t>]</a:t>
+                      </a:r>
+                      <a:endParaRPr lang="en-US" sz="2400" b="0" kern="1200" dirty="0">
+                        <a:solidFill>
+                          <a:schemeClr val="tx1"/>
+                        </a:solidFill>
+                        <a:latin typeface="+mn-lt"/>
+                        <a:ea typeface="+mn-ea"/>
+                        <a:cs typeface="+mn-cs"/>
+                      </a:endParaRPr>
+                    </a:p>
+                  </a:txBody>
+                  <a:tcPr>
+                    <a:solidFill>
+                      <a:schemeClr val="bg1">
+                        <a:lumMod val="85000"/>
+                      </a:schemeClr>
+                    </a:solidFill>
+                  </a:tcPr>
+                </a:tc>
+                <a:tc>
+                  <a:txBody>
+                    <a:bodyPr/>
+                    <a:lstStyle/>
+                    <a:p>
+                      <a:r>
+                        <a:rPr lang="en-US" sz="2400" b="0" kern="1200" dirty="0" smtClean="0">
+                          <a:solidFill>
+                            <a:schemeClr val="tx1"/>
+                          </a:solidFill>
+                          <a:latin typeface="+mn-lt"/>
+                          <a:ea typeface="+mn-ea"/>
+                          <a:cs typeface="+mn-cs"/>
+                        </a:rPr>
+                        <a:t>Matches a, b or c</a:t>
+                      </a:r>
+                      <a:endParaRPr lang="en-US" sz="2400" b="0" kern="1200" dirty="0">
+                        <a:solidFill>
+                          <a:schemeClr val="tx1"/>
+                        </a:solidFill>
+                        <a:latin typeface="+mn-lt"/>
+                        <a:ea typeface="+mn-ea"/>
+                        <a:cs typeface="+mn-cs"/>
+                      </a:endParaRPr>
+                    </a:p>
+                  </a:txBody>
+                  <a:tcPr/>
+                </a:tc>
+                <a:extLst>
+                  <a:ext uri="{0D108BD9-81ED-4DB2-BD59-A6C34878D82A}">
+                    <a16:rowId xmlns:a16="http://schemas.microsoft.com/office/drawing/2014/main" val="3626129505"/>
+                  </a:ext>
+                </a:extLst>
+              </a:tr>
+              <a:tr h="430435">
+                <a:tc>
+                  <a:txBody>
+                    <a:bodyPr/>
+                    <a:lstStyle/>
+                    <a:p>
+                      <a:r>
+                        <a:rPr lang="en-GB" sz="2400" b="0" kern="1200" dirty="0" smtClean="0">
+                          <a:solidFill>
+                            <a:schemeClr val="tx1"/>
+                          </a:solidFill>
+                          <a:latin typeface="+mn-lt"/>
+                          <a:ea typeface="+mn-ea"/>
+                          <a:cs typeface="+mn-cs"/>
+                        </a:rPr>
+                        <a:t>[^</a:t>
+                      </a:r>
+                      <a:r>
+                        <a:rPr lang="en-GB" sz="2400" b="0" kern="1200" dirty="0" err="1" smtClean="0">
+                          <a:solidFill>
+                            <a:schemeClr val="tx1"/>
+                          </a:solidFill>
+                          <a:latin typeface="+mn-lt"/>
+                          <a:ea typeface="+mn-ea"/>
+                          <a:cs typeface="+mn-cs"/>
+                        </a:rPr>
+                        <a:t>abc</a:t>
+                      </a:r>
+                      <a:r>
+                        <a:rPr lang="en-GB" sz="2400" b="0" kern="1200" dirty="0" smtClean="0">
+                          <a:solidFill>
+                            <a:schemeClr val="tx1"/>
+                          </a:solidFill>
+                          <a:latin typeface="+mn-lt"/>
+                          <a:ea typeface="+mn-ea"/>
+                          <a:cs typeface="+mn-cs"/>
+                        </a:rPr>
+                        <a:t>]</a:t>
+                      </a:r>
+                      <a:r>
+                        <a:rPr lang="en-US" sz="2400" b="0" kern="1200" dirty="0" smtClean="0">
+                          <a:solidFill>
+                            <a:schemeClr val="tx1"/>
+                          </a:solidFill>
+                          <a:latin typeface="+mn-lt"/>
+                          <a:ea typeface="+mn-ea"/>
+                          <a:cs typeface="+mn-cs"/>
+                        </a:rPr>
+                        <a:t> </a:t>
+                      </a:r>
+                      <a:endParaRPr lang="en-US" sz="2400" b="0" kern="1200" dirty="0">
+                        <a:solidFill>
+                          <a:schemeClr val="tx1"/>
+                        </a:solidFill>
+                        <a:latin typeface="+mn-lt"/>
+                        <a:ea typeface="+mn-ea"/>
+                        <a:cs typeface="+mn-cs"/>
+                      </a:endParaRPr>
+                    </a:p>
+                  </a:txBody>
+                  <a:tcPr>
+                    <a:solidFill>
+                      <a:schemeClr val="bg1">
+                        <a:lumMod val="85000"/>
+                      </a:schemeClr>
+                    </a:solidFill>
+                  </a:tcPr>
+                </a:tc>
+                <a:tc>
+                  <a:txBody>
+                    <a:bodyPr/>
+                    <a:lstStyle/>
+                    <a:p>
+                      <a:r>
+                        <a:rPr lang="en-GB" sz="2400" b="0" kern="1200" dirty="0" smtClean="0">
+                          <a:solidFill>
+                            <a:schemeClr val="tx1"/>
+                          </a:solidFill>
+                          <a:latin typeface="+mn-lt"/>
+                          <a:ea typeface="+mn-ea"/>
+                          <a:cs typeface="+mn-cs"/>
+                        </a:rPr>
+                        <a:t>Matches anything except a, b, or c.</a:t>
+                      </a:r>
+                      <a:endParaRPr lang="en-US" sz="2400" b="0" kern="1200" dirty="0">
+                        <a:solidFill>
+                          <a:schemeClr val="tx1"/>
+                        </a:solidFill>
+                        <a:latin typeface="+mn-lt"/>
+                        <a:ea typeface="+mn-ea"/>
+                        <a:cs typeface="+mn-cs"/>
+                      </a:endParaRPr>
+                    </a:p>
+                  </a:txBody>
+                  <a:tcPr/>
+                </a:tc>
+                <a:extLst>
+                  <a:ext uri="{0D108BD9-81ED-4DB2-BD59-A6C34878D82A}">
+                    <a16:rowId xmlns:a16="http://schemas.microsoft.com/office/drawing/2014/main" val="2605753601"/>
+                  </a:ext>
+                </a:extLst>
+              </a:tr>
+              <a:tr h="430435">
+                <a:tc>
+                  <a:txBody>
+                    <a:bodyPr/>
+                    <a:lstStyle/>
+                    <a:p>
+                      <a:r>
+                        <a:rPr lang="en-GB" sz="2400" b="0" kern="1200" dirty="0" smtClean="0">
+                          <a:solidFill>
+                            <a:schemeClr val="tx1"/>
+                          </a:solidFill>
+                          <a:latin typeface="+mn-lt"/>
+                          <a:ea typeface="+mn-ea"/>
+                          <a:cs typeface="+mn-cs"/>
+                        </a:rPr>
+                        <a:t>[:</a:t>
+                      </a:r>
+                      <a:r>
+                        <a:rPr lang="en-GB" sz="2400" b="0" kern="1200" dirty="0" err="1" smtClean="0">
+                          <a:solidFill>
+                            <a:schemeClr val="tx1"/>
+                          </a:solidFill>
+                          <a:latin typeface="+mn-lt"/>
+                          <a:ea typeface="+mn-ea"/>
+                          <a:cs typeface="+mn-cs"/>
+                        </a:rPr>
+                        <a:t>punct</a:t>
+                      </a:r>
+                      <a:r>
+                        <a:rPr lang="en-GB" sz="2400" b="0" kern="1200" dirty="0" smtClean="0">
+                          <a:solidFill>
+                            <a:schemeClr val="tx1"/>
+                          </a:solidFill>
+                          <a:latin typeface="+mn-lt"/>
+                          <a:ea typeface="+mn-ea"/>
+                          <a:cs typeface="+mn-cs"/>
+                        </a:rPr>
+                        <a:t>:]</a:t>
+                      </a:r>
+                      <a:endParaRPr lang="en-US" sz="2400" b="0" kern="1200" dirty="0">
+                        <a:solidFill>
+                          <a:schemeClr val="tx1"/>
+                        </a:solidFill>
+                        <a:latin typeface="+mn-lt"/>
+                        <a:ea typeface="+mn-ea"/>
+                        <a:cs typeface="+mn-cs"/>
+                      </a:endParaRPr>
+                    </a:p>
+                  </a:txBody>
+                  <a:tcPr>
+                    <a:solidFill>
+                      <a:schemeClr val="bg1">
+                        <a:lumMod val="85000"/>
+                      </a:schemeClr>
+                    </a:solidFill>
+                  </a:tcPr>
+                </a:tc>
+                <a:tc>
+                  <a:txBody>
+                    <a:bodyPr/>
+                    <a:lstStyle/>
+                    <a:p>
+                      <a:r>
+                        <a:rPr lang="en-GB" sz="2400" b="0" kern="1200" dirty="0" smtClean="0">
+                          <a:solidFill>
+                            <a:schemeClr val="tx1"/>
+                          </a:solidFill>
+                          <a:latin typeface="+mn-lt"/>
+                          <a:ea typeface="+mn-ea"/>
+                          <a:cs typeface="+mn-cs"/>
+                        </a:rPr>
+                        <a:t>punctuation characters, ! " # $ % &amp; ’ ( ) * + , - . / : ; &lt; = &gt; ? @ [  ] ^ _ ` { | } ~</a:t>
+                      </a:r>
+                      <a:endParaRPr lang="en-US" sz="2400" b="0" kern="1200" dirty="0">
+                        <a:solidFill>
+                          <a:schemeClr val="tx1"/>
+                        </a:solidFill>
+                        <a:latin typeface="+mn-lt"/>
+                        <a:ea typeface="+mn-ea"/>
+                        <a:cs typeface="+mn-cs"/>
+                      </a:endParaRPr>
+                    </a:p>
+                  </a:txBody>
+                  <a:tcPr/>
+                </a:tc>
+                <a:extLst>
+                  <a:ext uri="{0D108BD9-81ED-4DB2-BD59-A6C34878D82A}">
+                    <a16:rowId xmlns:a16="http://schemas.microsoft.com/office/drawing/2014/main" val="1165361152"/>
+                  </a:ext>
+                </a:extLst>
+              </a:tr>
+              <a:tr h="430435">
+                <a:tc>
+                  <a:txBody>
+                    <a:bodyPr/>
+                    <a:lstStyle/>
+                    <a:p>
+                      <a:r>
+                        <a:rPr lang="en-GB" sz="2400" b="0" kern="1200" dirty="0" smtClean="0">
+                          <a:solidFill>
+                            <a:schemeClr val="tx1"/>
+                          </a:solidFill>
+                          <a:latin typeface="+mn-lt"/>
+                          <a:ea typeface="+mn-ea"/>
+                          <a:cs typeface="+mn-cs"/>
+                        </a:rPr>
+                        <a:t>{n,}</a:t>
+                      </a:r>
+                      <a:endParaRPr lang="en-US" sz="2400" b="0" kern="1200" dirty="0">
+                        <a:solidFill>
+                          <a:schemeClr val="tx1"/>
+                        </a:solidFill>
+                        <a:latin typeface="+mn-lt"/>
+                        <a:ea typeface="+mn-ea"/>
+                        <a:cs typeface="+mn-cs"/>
+                      </a:endParaRPr>
+                    </a:p>
+                  </a:txBody>
+                  <a:tcPr>
+                    <a:solidFill>
+                      <a:schemeClr val="bg1">
+                        <a:lumMod val="85000"/>
+                      </a:schemeClr>
+                    </a:solidFill>
+                  </a:tcPr>
+                </a:tc>
+                <a:tc>
+                  <a:txBody>
+                    <a:bodyPr/>
+                    <a:lstStyle/>
+                    <a:p>
+                      <a:r>
+                        <a:rPr lang="en-GB" sz="2400" b="0" kern="1200" dirty="0" smtClean="0">
+                          <a:solidFill>
+                            <a:schemeClr val="tx1"/>
+                          </a:solidFill>
+                          <a:latin typeface="+mn-lt"/>
+                          <a:ea typeface="+mn-ea"/>
+                          <a:cs typeface="+mn-cs"/>
+                        </a:rPr>
+                        <a:t>n or more matches</a:t>
+                      </a:r>
+                      <a:endParaRPr lang="en-US" sz="2400" b="0" kern="1200" dirty="0">
+                        <a:solidFill>
+                          <a:schemeClr val="tx1"/>
+                        </a:solidFill>
+                        <a:latin typeface="+mn-lt"/>
+                        <a:ea typeface="+mn-ea"/>
+                        <a:cs typeface="+mn-cs"/>
+                      </a:endParaRPr>
+                    </a:p>
+                  </a:txBody>
+                  <a:tcPr/>
+                </a:tc>
+                <a:extLst>
+                  <a:ext uri="{0D108BD9-81ED-4DB2-BD59-A6C34878D82A}">
+                    <a16:rowId xmlns:a16="http://schemas.microsoft.com/office/drawing/2014/main" val="714321488"/>
+                  </a:ext>
+                </a:extLst>
+              </a:tr>
+              <a:tr h="430435">
+                <a:tc>
+                  <a:txBody>
+                    <a:bodyPr/>
+                    <a:lstStyle/>
+                    <a:p>
+                      <a:r>
+                        <a:rPr lang="en-GB" sz="2400" b="0" kern="1200" dirty="0" smtClean="0">
+                          <a:solidFill>
+                            <a:schemeClr val="tx1"/>
+                          </a:solidFill>
+                          <a:latin typeface="+mn-lt"/>
+                          <a:ea typeface="+mn-ea"/>
+                          <a:cs typeface="+mn-cs"/>
+                        </a:rPr>
+                        <a:t>{,m}</a:t>
+                      </a:r>
+                      <a:endParaRPr lang="en-US" sz="2400" b="0" kern="1200" dirty="0">
+                        <a:solidFill>
+                          <a:schemeClr val="tx1"/>
+                        </a:solidFill>
+                        <a:latin typeface="+mn-lt"/>
+                        <a:ea typeface="+mn-ea"/>
+                        <a:cs typeface="+mn-cs"/>
+                      </a:endParaRPr>
+                    </a:p>
+                  </a:txBody>
+                  <a:tcPr>
+                    <a:solidFill>
+                      <a:schemeClr val="bg1">
+                        <a:lumMod val="85000"/>
+                      </a:schemeClr>
+                    </a:solidFill>
+                  </a:tcPr>
+                </a:tc>
+                <a:tc>
+                  <a:txBody>
+                    <a:bodyPr/>
+                    <a:lstStyle/>
+                    <a:p>
+                      <a:r>
+                        <a:rPr lang="en-GB" sz="2400" b="0" kern="1200" dirty="0" smtClean="0">
+                          <a:solidFill>
+                            <a:schemeClr val="tx1"/>
+                          </a:solidFill>
+                          <a:latin typeface="+mn-lt"/>
+                          <a:ea typeface="+mn-ea"/>
+                          <a:cs typeface="+mn-cs"/>
+                        </a:rPr>
+                        <a:t>at most m matches</a:t>
+                      </a:r>
+                      <a:endParaRPr lang="en-US" sz="2400" b="0" kern="1200" dirty="0">
+                        <a:solidFill>
+                          <a:schemeClr val="tx1"/>
+                        </a:solidFill>
+                        <a:latin typeface="+mn-lt"/>
+                        <a:ea typeface="+mn-ea"/>
+                        <a:cs typeface="+mn-cs"/>
+                      </a:endParaRPr>
+                    </a:p>
+                  </a:txBody>
+                  <a:tcPr/>
+                </a:tc>
+                <a:extLst>
+                  <a:ext uri="{0D108BD9-81ED-4DB2-BD59-A6C34878D82A}">
+                    <a16:rowId xmlns:a16="http://schemas.microsoft.com/office/drawing/2014/main" val="119559271"/>
+                  </a:ext>
+                </a:extLst>
+              </a:tr>
+              <a:tr h="430435">
+                <a:tc>
+                  <a:txBody>
+                    <a:bodyPr/>
+                    <a:lstStyle/>
+                    <a:p>
+                      <a:r>
+                        <a:rPr lang="en-GB" sz="2400" b="0" kern="1200" dirty="0" smtClean="0">
+                          <a:solidFill>
+                            <a:schemeClr val="tx1"/>
+                          </a:solidFill>
+                          <a:latin typeface="+mn-lt"/>
+                          <a:ea typeface="+mn-ea"/>
+                          <a:cs typeface="+mn-cs"/>
+                        </a:rPr>
+                        <a:t>{</a:t>
+                      </a:r>
+                      <a:r>
+                        <a:rPr lang="en-GB" sz="2400" b="0" kern="1200" dirty="0" err="1" smtClean="0">
+                          <a:solidFill>
+                            <a:schemeClr val="tx1"/>
+                          </a:solidFill>
+                          <a:latin typeface="+mn-lt"/>
+                          <a:ea typeface="+mn-ea"/>
+                          <a:cs typeface="+mn-cs"/>
+                        </a:rPr>
+                        <a:t>n,m</a:t>
+                      </a:r>
+                      <a:r>
+                        <a:rPr lang="en-GB" sz="2400" b="0" kern="1200" dirty="0" smtClean="0">
+                          <a:solidFill>
+                            <a:schemeClr val="tx1"/>
+                          </a:solidFill>
+                          <a:latin typeface="+mn-lt"/>
+                          <a:ea typeface="+mn-ea"/>
+                          <a:cs typeface="+mn-cs"/>
+                        </a:rPr>
+                        <a:t>}</a:t>
+                      </a:r>
+                      <a:endParaRPr lang="en-US" sz="2400" b="0" kern="1200" dirty="0">
+                        <a:solidFill>
+                          <a:schemeClr val="tx1"/>
+                        </a:solidFill>
+                        <a:latin typeface="+mn-lt"/>
+                        <a:ea typeface="+mn-ea"/>
+                        <a:cs typeface="+mn-cs"/>
+                      </a:endParaRPr>
+                    </a:p>
+                  </a:txBody>
+                  <a:tcPr>
+                    <a:solidFill>
+                      <a:schemeClr val="bg1">
+                        <a:lumMod val="85000"/>
+                      </a:schemeClr>
+                    </a:solidFill>
+                  </a:tcPr>
+                </a:tc>
+                <a:tc>
+                  <a:txBody>
+                    <a:bodyPr/>
+                    <a:lstStyle/>
+                    <a:p>
+                      <a:r>
+                        <a:rPr lang="en-GB" sz="2400" b="0" kern="1200" dirty="0" smtClean="0">
+                          <a:solidFill>
+                            <a:schemeClr val="tx1"/>
+                          </a:solidFill>
+                          <a:latin typeface="+mn-lt"/>
+                          <a:ea typeface="+mn-ea"/>
+                          <a:cs typeface="+mn-cs"/>
+                        </a:rPr>
+                        <a:t>between n and m matches</a:t>
+                      </a:r>
+                      <a:endParaRPr lang="en-US" sz="2400" b="0" kern="1200" dirty="0">
+                        <a:solidFill>
+                          <a:schemeClr val="tx1"/>
+                        </a:solidFill>
+                        <a:latin typeface="+mn-lt"/>
+                        <a:ea typeface="+mn-ea"/>
+                        <a:cs typeface="+mn-cs"/>
+                      </a:endParaRPr>
+                    </a:p>
+                  </a:txBody>
+                  <a:tcPr/>
+                </a:tc>
+                <a:extLst>
+                  <a:ext uri="{0D108BD9-81ED-4DB2-BD59-A6C34878D82A}">
+                    <a16:rowId xmlns:a16="http://schemas.microsoft.com/office/drawing/2014/main" val="869907065"/>
+                  </a:ext>
+                </a:extLst>
+              </a:tr>
+            </a:tbl>
+          </a:graphicData>
+        </a:graphic>
+      </p:graphicFrame>
     </p:spTree>
     <p:extLst>
       <p:ext uri="{BB962C8B-B14F-4D97-AF65-F5344CB8AC3E}">
-        <p14:creationId xmlns:p14="http://schemas.microsoft.com/office/powerpoint/2010/main" val="435130784"/>
+        <p14:creationId xmlns:p14="http://schemas.microsoft.com/office/powerpoint/2010/main" val="2598154914"/>
       </p:ext>
     </p:extLst>
   </p:cSld>
@@ -4304,56 +5945,196 @@
           <a:lstStyle/>
           <a:p>
             <a:r>
-              <a:rPr lang="en-US" b="1" dirty="0">
-                <a:effectLst>
-                  <a:outerShdw blurRad="38100" dist="38100" dir="2700000" algn="tl">
-                    <a:srgbClr val="000000">
-                      <a:alpha val="43137"/>
-                    </a:srgbClr>
-                  </a:outerShdw>
-                </a:effectLst>
+              <a:rPr lang="en-US" dirty="0" smtClean="0"/>
+              <a:t>Text Normalization</a:t>
+            </a:r>
+            <a:endParaRPr lang="en-US" dirty="0"/>
+          </a:p>
+        </p:txBody>
+      </p:sp>
+      <p:sp>
+        <p:nvSpPr>
+          <p:cNvPr id="3" name="Inhaltsplatzhalter 2"/>
+          <p:cNvSpPr>
+            <a:spLocks noGrp="1"/>
+          </p:cNvSpPr>
+          <p:nvPr>
+            <p:ph idx="1"/>
+          </p:nvPr>
+        </p:nvSpPr>
+        <p:spPr/>
+        <p:txBody>
+          <a:bodyPr/>
+          <a:lstStyle/>
+          <a:p>
+            <a:r>
+              <a:rPr lang="en-US" dirty="0" smtClean="0"/>
+              <a:t>Series of steps to clean and standardize textual data</a:t>
+            </a:r>
+          </a:p>
+          <a:p>
+            <a:r>
+              <a:rPr lang="en-US" dirty="0" smtClean="0"/>
+              <a:t>Basic techniques:</a:t>
+            </a:r>
+          </a:p>
+          <a:p>
+            <a:pPr lvl="1"/>
+            <a:r>
+              <a:rPr lang="en-US" dirty="0" smtClean="0"/>
+              <a:t>Removing </a:t>
+            </a:r>
+            <a:r>
+              <a:rPr lang="en-US" dirty="0" err="1" smtClean="0"/>
+              <a:t>stopwords</a:t>
+            </a:r>
+            <a:r>
+              <a:rPr lang="en-US" dirty="0" smtClean="0"/>
+              <a:t>: words with little or significance (the list can be enriched manually)</a:t>
+            </a:r>
+          </a:p>
+          <a:p>
+            <a:pPr lvl="1"/>
+            <a:r>
+              <a:rPr lang="en-GB" dirty="0"/>
+              <a:t>Removing special characters </a:t>
+            </a:r>
+            <a:r>
+              <a:rPr lang="en-GB" dirty="0" smtClean="0"/>
+              <a:t>(symbols, punctuation, HTML-entities etc.)</a:t>
+            </a:r>
+            <a:endParaRPr lang="en-US" dirty="0" smtClean="0"/>
+          </a:p>
+          <a:p>
+            <a:pPr lvl="1"/>
+            <a:r>
+              <a:rPr lang="en-US" dirty="0" smtClean="0"/>
+              <a:t>Stemming, Lemmatization</a:t>
+            </a:r>
+          </a:p>
+          <a:p>
+            <a:pPr marL="457200" lvl="1" indent="0">
+              <a:buNone/>
+            </a:pPr>
+            <a:endParaRPr lang="en-US" dirty="0" smtClean="0"/>
+          </a:p>
+          <a:p>
+            <a:pPr marL="0" indent="0">
+              <a:buNone/>
+            </a:pPr>
+            <a:r>
+              <a:rPr lang="de-DE" b="1" i="1" dirty="0" smtClean="0">
+                <a:solidFill>
+                  <a:srgbClr val="FF0000"/>
+                </a:solidFill>
               </a:rPr>
-              <a:t>Part II: Scraping &amp; Text Cleaning</a:t>
-            </a:r>
-          </a:p>
-        </p:txBody>
-      </p:sp>
-      <p:sp>
-        <p:nvSpPr>
-          <p:cNvPr id="3" name="Textplatzhalter 2"/>
-          <p:cNvSpPr>
-            <a:spLocks noGrp="1"/>
-          </p:cNvSpPr>
-          <p:nvPr>
-            <p:ph type="body" idx="1"/>
-          </p:nvPr>
-        </p:nvSpPr>
-        <p:spPr/>
-        <p:txBody>
-          <a:bodyPr/>
-          <a:lstStyle/>
-          <a:p>
-            <a:r>
-              <a:rPr lang="en-US" b="1" dirty="0" smtClean="0">
-                <a:effectLst>
-                  <a:outerShdw blurRad="38100" dist="38100" dir="2700000" algn="tl">
-                    <a:srgbClr val="000000">
-                      <a:alpha val="43137"/>
-                    </a:srgbClr>
-                  </a:outerShdw>
-                </a:effectLst>
+              <a:t>Die</a:t>
+            </a:r>
+            <a:r>
+              <a:rPr lang="de-DE" i="1" dirty="0" smtClean="0"/>
+              <a:t> </a:t>
+            </a:r>
+            <a:r>
+              <a:rPr lang="de-DE" i="1" dirty="0"/>
+              <a:t>Ausgrenzung </a:t>
+            </a:r>
+            <a:r>
+              <a:rPr lang="de-DE" b="1" i="1" dirty="0">
+                <a:solidFill>
+                  <a:srgbClr val="FF0000"/>
+                </a:solidFill>
               </a:rPr>
-              <a:t>Literature and References</a:t>
-            </a:r>
-            <a:endParaRPr lang="en-US" b="1" dirty="0">
-              <a:effectLst>
-                <a:outerShdw blurRad="38100" dist="38100" dir="2700000" algn="tl">
-                  <a:srgbClr val="000000">
-                    <a:alpha val="43137"/>
-                  </a:srgbClr>
-                </a:outerShdw>
-              </a:effectLst>
-            </a:endParaRPr>
+              <a:t>von</a:t>
+            </a:r>
+            <a:r>
+              <a:rPr lang="de-DE" i="1" dirty="0"/>
+              <a:t> </a:t>
+            </a:r>
+            <a:r>
+              <a:rPr lang="de-DE" i="1" dirty="0" err="1"/>
+              <a:t>Migrant</a:t>
+            </a:r>
+            <a:r>
+              <a:rPr lang="de-DE" b="1" i="1" dirty="0" err="1">
+                <a:solidFill>
+                  <a:srgbClr val="FF0000"/>
+                </a:solidFill>
+              </a:rPr>
+              <a:t>Innen</a:t>
+            </a:r>
+            <a:r>
+              <a:rPr lang="de-DE" i="1" dirty="0"/>
+              <a:t> von der </a:t>
+            </a:r>
+            <a:r>
+              <a:rPr lang="de-DE" b="1" i="1" dirty="0">
+                <a:solidFill>
+                  <a:srgbClr val="FF0000"/>
+                </a:solidFill>
+              </a:rPr>
+              <a:t>#</a:t>
+            </a:r>
+            <a:r>
+              <a:rPr lang="de-DE" i="1" dirty="0"/>
+              <a:t> </a:t>
+            </a:r>
+            <a:r>
+              <a:rPr lang="de-DE" i="1" dirty="0" err="1"/>
+              <a:t>EssenerTafel</a:t>
+            </a:r>
+            <a:r>
+              <a:rPr lang="de-DE" i="1" dirty="0"/>
+              <a:t> ist inakzeptabel </a:t>
+            </a:r>
+            <a:r>
+              <a:rPr lang="de-DE" b="1" i="1" dirty="0">
+                <a:solidFill>
+                  <a:srgbClr val="FF0000"/>
+                </a:solidFill>
+              </a:rPr>
+              <a:t>und</a:t>
+            </a:r>
+            <a:r>
+              <a:rPr lang="de-DE" i="1" dirty="0"/>
+              <a:t> rassistisch. Wir dürfen nicht zulassen, </a:t>
+            </a:r>
+            <a:r>
+              <a:rPr lang="de-DE" b="1" i="1" dirty="0">
+                <a:solidFill>
+                  <a:srgbClr val="FF0000"/>
+                </a:solidFill>
+              </a:rPr>
+              <a:t>dass</a:t>
+            </a:r>
+            <a:r>
+              <a:rPr lang="de-DE" i="1" dirty="0"/>
+              <a:t> </a:t>
+            </a:r>
+            <a:r>
+              <a:rPr lang="de-DE" b="1" i="1" dirty="0">
+                <a:solidFill>
+                  <a:srgbClr val="FF0000"/>
+                </a:solidFill>
+              </a:rPr>
+              <a:t>die</a:t>
+            </a:r>
+            <a:r>
+              <a:rPr lang="de-DE" i="1" dirty="0"/>
+              <a:t> Ärmsten gegeneinander </a:t>
+            </a:r>
+            <a:r>
+              <a:rPr lang="de-DE" b="1" i="1" dirty="0">
+                <a:solidFill>
+                  <a:srgbClr val="FF0000"/>
+                </a:solidFill>
+              </a:rPr>
+              <a:t>ausgespielt</a:t>
+            </a:r>
+            <a:r>
+              <a:rPr lang="de-DE" i="1" dirty="0"/>
+              <a:t> werden.</a:t>
+            </a:r>
+            <a:endParaRPr lang="en-US" dirty="0"/>
           </a:p>
         </p:txBody>
       </p:sp>
@@ -4383,7 +6164,7 @@
     </p:spTree>
     <p:extLst>
       <p:ext uri="{BB962C8B-B14F-4D97-AF65-F5344CB8AC3E}">
-        <p14:creationId xmlns:p14="http://schemas.microsoft.com/office/powerpoint/2010/main" val="3419717452"/>
+        <p14:creationId xmlns:p14="http://schemas.microsoft.com/office/powerpoint/2010/main" val="333706170"/>
       </p:ext>
     </p:extLst>
   </p:cSld>
@@ -4412,6 +6193,1474 @@
       </p:grpSpPr>
       <p:sp>
         <p:nvSpPr>
+          <p:cNvPr id="2" name="Titel 1"/>
+          <p:cNvSpPr>
+            <a:spLocks noGrp="1"/>
+          </p:cNvSpPr>
+          <p:nvPr>
+            <p:ph type="title"/>
+          </p:nvPr>
+        </p:nvSpPr>
+        <p:spPr/>
+        <p:txBody>
+          <a:bodyPr/>
+          <a:lstStyle/>
+          <a:p>
+            <a:r>
+              <a:rPr lang="en-US" dirty="0" smtClean="0"/>
+              <a:t>Stemming</a:t>
+            </a:r>
+            <a:endParaRPr lang="en-US" dirty="0"/>
+          </a:p>
+        </p:txBody>
+      </p:sp>
+      <p:sp>
+        <p:nvSpPr>
+          <p:cNvPr id="3" name="Inhaltsplatzhalter 2"/>
+          <p:cNvSpPr>
+            <a:spLocks noGrp="1"/>
+          </p:cNvSpPr>
+          <p:nvPr>
+            <p:ph idx="1"/>
+          </p:nvPr>
+        </p:nvSpPr>
+        <p:spPr>
+          <a:xfrm>
+            <a:off x="838200" y="1825624"/>
+            <a:ext cx="10515600" cy="4773479"/>
+          </a:xfrm>
+        </p:spPr>
+        <p:txBody>
+          <a:bodyPr>
+            <a:normAutofit fontScale="92500" lnSpcReduction="10000"/>
+          </a:bodyPr>
+          <a:lstStyle/>
+          <a:p>
+            <a:r>
+              <a:rPr lang="en-US" dirty="0" smtClean="0"/>
+              <a:t>Idea: Get back the base form, the </a:t>
+            </a:r>
+            <a:r>
+              <a:rPr lang="en-GB" dirty="0" smtClean="0"/>
+              <a:t>root stem</a:t>
+            </a:r>
+            <a:endParaRPr lang="en-GB" dirty="0"/>
+          </a:p>
+          <a:p>
+            <a:endParaRPr lang="de-DE" dirty="0" smtClean="0"/>
+          </a:p>
+          <a:p>
+            <a:endParaRPr lang="de-DE" dirty="0" smtClean="0"/>
+          </a:p>
+          <a:p>
+            <a:endParaRPr lang="de-DE" dirty="0"/>
+          </a:p>
+          <a:p>
+            <a:endParaRPr lang="de-DE" dirty="0"/>
+          </a:p>
+          <a:p>
+            <a:endParaRPr lang="de-DE" dirty="0" smtClean="0"/>
+          </a:p>
+          <a:p>
+            <a:endParaRPr lang="en-US" dirty="0"/>
+          </a:p>
+          <a:p>
+            <a:pPr lvl="1"/>
+            <a:endParaRPr lang="en-US" dirty="0" smtClean="0"/>
+          </a:p>
+          <a:p>
+            <a:endParaRPr lang="en-US" dirty="0" smtClean="0"/>
+          </a:p>
+          <a:p>
+            <a:r>
+              <a:rPr lang="en-US" dirty="0" smtClean="0"/>
+              <a:t>Example in German: </a:t>
+            </a:r>
+            <a:r>
+              <a:rPr lang="de-DE" i="1" dirty="0"/>
+              <a:t>Bruder – Bruders – brüderlich – </a:t>
+            </a:r>
+            <a:r>
+              <a:rPr lang="de-DE" i="1" dirty="0" err="1"/>
+              <a:t>Brüderlichkeiten</a:t>
+            </a:r>
+            <a:r>
+              <a:rPr lang="de-DE" i="1" dirty="0"/>
+              <a:t> </a:t>
+            </a:r>
+            <a:endParaRPr lang="de-DE" i="1" dirty="0" smtClean="0"/>
+          </a:p>
+          <a:p>
+            <a:pPr marL="0" indent="0">
+              <a:buNone/>
+            </a:pPr>
+            <a:r>
+              <a:rPr lang="de-DE" i="1" dirty="0" smtClean="0"/>
+              <a:t>→ </a:t>
+            </a:r>
+            <a:r>
+              <a:rPr lang="de-DE" i="1" dirty="0" err="1"/>
+              <a:t>bruder</a:t>
+            </a:r>
+            <a:endParaRPr lang="en-US" i="1" dirty="0"/>
+          </a:p>
+          <a:p>
+            <a:pPr lvl="1"/>
+            <a:endParaRPr lang="en-US" dirty="0" smtClean="0"/>
+          </a:p>
+        </p:txBody>
+      </p:sp>
+      <p:sp>
+        <p:nvSpPr>
+          <p:cNvPr id="4" name="Foliennummernplatzhalter 3"/>
+          <p:cNvSpPr>
+            <a:spLocks noGrp="1"/>
+          </p:cNvSpPr>
+          <p:nvPr>
+            <p:ph type="sldNum" sz="quarter" idx="12"/>
+          </p:nvPr>
+        </p:nvSpPr>
+        <p:spPr/>
+        <p:txBody>
+          <a:bodyPr/>
+          <a:lstStyle/>
+          <a:p>
+            <a:fld id="{C9E0B00B-E6DF-4183-A694-3DE28BEFB357}" type="slidenum">
+              <a:rPr lang="en-US" smtClean="0"/>
+              <a:t>13</a:t>
+            </a:fld>
+            <a:endParaRPr lang="en-US"/>
+          </a:p>
+        </p:txBody>
+      </p:sp>
+      <p:graphicFrame>
+        <p:nvGraphicFramePr>
+          <p:cNvPr id="5" name="Tabelle 4"/>
+          <p:cNvGraphicFramePr>
+            <a:graphicFrameLocks noGrp="1"/>
+          </p:cNvGraphicFramePr>
+          <p:nvPr>
+            <p:extLst>
+              <p:ext uri="{D42A27DB-BD31-4B8C-83A1-F6EECF244321}">
+                <p14:modId xmlns:p14="http://schemas.microsoft.com/office/powerpoint/2010/main" val="2203825479"/>
+              </p:ext>
+            </p:extLst>
+          </p:nvPr>
+        </p:nvGraphicFramePr>
+        <p:xfrm>
+          <a:off x="2989694" y="3311274"/>
+          <a:ext cx="2448000" cy="701040"/>
+        </p:xfrm>
+        <a:graphic>
+          <a:graphicData uri="http://schemas.openxmlformats.org/drawingml/2006/table">
+            <a:tbl>
+              <a:tblPr firstRow="1" bandRow="1">
+                <a:tableStyleId>{5940675A-B579-460E-94D1-54222C63F5DA}</a:tableStyleId>
+              </a:tblPr>
+              <a:tblGrid>
+                <a:gridCol w="612000">
+                  <a:extLst>
+                    <a:ext uri="{9D8B030D-6E8A-4147-A177-3AD203B41FA5}">
+                      <a16:colId xmlns:a16="http://schemas.microsoft.com/office/drawing/2014/main" val="142950798"/>
+                    </a:ext>
+                  </a:extLst>
+                </a:gridCol>
+                <a:gridCol w="612000">
+                  <a:extLst>
+                    <a:ext uri="{9D8B030D-6E8A-4147-A177-3AD203B41FA5}">
+                      <a16:colId xmlns:a16="http://schemas.microsoft.com/office/drawing/2014/main" val="1157056818"/>
+                    </a:ext>
+                  </a:extLst>
+                </a:gridCol>
+                <a:gridCol w="612000">
+                  <a:extLst>
+                    <a:ext uri="{9D8B030D-6E8A-4147-A177-3AD203B41FA5}">
+                      <a16:colId xmlns:a16="http://schemas.microsoft.com/office/drawing/2014/main" val="853121632"/>
+                    </a:ext>
+                  </a:extLst>
+                </a:gridCol>
+                <a:gridCol w="612000">
+                  <a:extLst>
+                    <a:ext uri="{9D8B030D-6E8A-4147-A177-3AD203B41FA5}">
+                      <a16:colId xmlns:a16="http://schemas.microsoft.com/office/drawing/2014/main" val="2217247634"/>
+                    </a:ext>
+                  </a:extLst>
+                </a:gridCol>
+              </a:tblGrid>
+              <a:tr h="448822">
+                <a:tc>
+                  <a:txBody>
+                    <a:bodyPr/>
+                    <a:lstStyle/>
+                    <a:p>
+                      <a:pPr algn="ctr"/>
+                      <a:r>
+                        <a:rPr lang="en-US" sz="4000" dirty="0" smtClean="0"/>
+                        <a:t>S</a:t>
+                      </a:r>
+                      <a:endParaRPr lang="en-US" sz="4000" dirty="0"/>
+                    </a:p>
+                  </a:txBody>
+                  <a:tcPr/>
+                </a:tc>
+                <a:tc>
+                  <a:txBody>
+                    <a:bodyPr/>
+                    <a:lstStyle/>
+                    <a:p>
+                      <a:pPr algn="ctr"/>
+                      <a:r>
+                        <a:rPr lang="en-US" sz="4000" dirty="0" smtClean="0"/>
+                        <a:t>I</a:t>
+                      </a:r>
+                      <a:endParaRPr lang="en-US" sz="4000" dirty="0"/>
+                    </a:p>
+                  </a:txBody>
+                  <a:tcPr/>
+                </a:tc>
+                <a:tc>
+                  <a:txBody>
+                    <a:bodyPr/>
+                    <a:lstStyle/>
+                    <a:p>
+                      <a:pPr algn="ctr"/>
+                      <a:r>
+                        <a:rPr lang="en-US" sz="4000" dirty="0" smtClean="0"/>
+                        <a:t>N</a:t>
+                      </a:r>
+                      <a:endParaRPr lang="en-US" sz="4000" dirty="0"/>
+                    </a:p>
+                  </a:txBody>
+                  <a:tcPr/>
+                </a:tc>
+                <a:tc>
+                  <a:txBody>
+                    <a:bodyPr/>
+                    <a:lstStyle/>
+                    <a:p>
+                      <a:pPr algn="ctr"/>
+                      <a:r>
+                        <a:rPr lang="en-US" sz="4000" dirty="0" smtClean="0"/>
+                        <a:t>G</a:t>
+                      </a:r>
+                      <a:endParaRPr lang="en-US" sz="4000" dirty="0"/>
+                    </a:p>
+                  </a:txBody>
+                  <a:tcPr/>
+                </a:tc>
+                <a:extLst>
+                  <a:ext uri="{0D108BD9-81ED-4DB2-BD59-A6C34878D82A}">
+                    <a16:rowId xmlns:a16="http://schemas.microsoft.com/office/drawing/2014/main" val="3234467160"/>
+                  </a:ext>
+                </a:extLst>
+              </a:tr>
+            </a:tbl>
+          </a:graphicData>
+        </a:graphic>
+      </p:graphicFrame>
+      <p:graphicFrame>
+        <p:nvGraphicFramePr>
+          <p:cNvPr id="6" name="Tabelle 5"/>
+          <p:cNvGraphicFramePr>
+            <a:graphicFrameLocks noGrp="1"/>
+          </p:cNvGraphicFramePr>
+          <p:nvPr>
+            <p:extLst>
+              <p:ext uri="{D42A27DB-BD31-4B8C-83A1-F6EECF244321}">
+                <p14:modId xmlns:p14="http://schemas.microsoft.com/office/powerpoint/2010/main" val="3628952708"/>
+              </p:ext>
+            </p:extLst>
+          </p:nvPr>
+        </p:nvGraphicFramePr>
+        <p:xfrm>
+          <a:off x="6382599" y="2475297"/>
+          <a:ext cx="612000" cy="701040"/>
+        </p:xfrm>
+        <a:graphic>
+          <a:graphicData uri="http://schemas.openxmlformats.org/drawingml/2006/table">
+            <a:tbl>
+              <a:tblPr firstRow="1" bandRow="1">
+                <a:tableStyleId>{5940675A-B579-460E-94D1-54222C63F5DA}</a:tableStyleId>
+              </a:tblPr>
+              <a:tblGrid>
+                <a:gridCol w="612000">
+                  <a:extLst>
+                    <a:ext uri="{9D8B030D-6E8A-4147-A177-3AD203B41FA5}">
+                      <a16:colId xmlns:a16="http://schemas.microsoft.com/office/drawing/2014/main" val="142950798"/>
+                    </a:ext>
+                  </a:extLst>
+                </a:gridCol>
+              </a:tblGrid>
+              <a:tr h="448822">
+                <a:tc>
+                  <a:txBody>
+                    <a:bodyPr/>
+                    <a:lstStyle/>
+                    <a:p>
+                      <a:pPr algn="ctr"/>
+                      <a:r>
+                        <a:rPr lang="en-US" sz="4000" dirty="0" smtClean="0"/>
+                        <a:t>S</a:t>
+                      </a:r>
+                      <a:endParaRPr lang="en-US" sz="4000" dirty="0"/>
+                    </a:p>
+                  </a:txBody>
+                  <a:tcPr/>
+                </a:tc>
+                <a:extLst>
+                  <a:ext uri="{0D108BD9-81ED-4DB2-BD59-A6C34878D82A}">
+                    <a16:rowId xmlns:a16="http://schemas.microsoft.com/office/drawing/2014/main" val="3234467160"/>
+                  </a:ext>
+                </a:extLst>
+              </a:tr>
+            </a:tbl>
+          </a:graphicData>
+        </a:graphic>
+      </p:graphicFrame>
+      <p:graphicFrame>
+        <p:nvGraphicFramePr>
+          <p:cNvPr id="7" name="Tabelle 6"/>
+          <p:cNvGraphicFramePr>
+            <a:graphicFrameLocks noGrp="1"/>
+          </p:cNvGraphicFramePr>
+          <p:nvPr>
+            <p:extLst>
+              <p:ext uri="{D42A27DB-BD31-4B8C-83A1-F6EECF244321}">
+                <p14:modId xmlns:p14="http://schemas.microsoft.com/office/powerpoint/2010/main" val="3027047988"/>
+              </p:ext>
+            </p:extLst>
+          </p:nvPr>
+        </p:nvGraphicFramePr>
+        <p:xfrm>
+          <a:off x="6382599" y="3311274"/>
+          <a:ext cx="1224000" cy="701040"/>
+        </p:xfrm>
+        <a:graphic>
+          <a:graphicData uri="http://schemas.openxmlformats.org/drawingml/2006/table">
+            <a:tbl>
+              <a:tblPr firstRow="1" bandRow="1">
+                <a:tableStyleId>{5940675A-B579-460E-94D1-54222C63F5DA}</a:tableStyleId>
+              </a:tblPr>
+              <a:tblGrid>
+                <a:gridCol w="612000">
+                  <a:extLst>
+                    <a:ext uri="{9D8B030D-6E8A-4147-A177-3AD203B41FA5}">
+                      <a16:colId xmlns:a16="http://schemas.microsoft.com/office/drawing/2014/main" val="142950798"/>
+                    </a:ext>
+                  </a:extLst>
+                </a:gridCol>
+                <a:gridCol w="612000">
+                  <a:extLst>
+                    <a:ext uri="{9D8B030D-6E8A-4147-A177-3AD203B41FA5}">
+                      <a16:colId xmlns:a16="http://schemas.microsoft.com/office/drawing/2014/main" val="1157056818"/>
+                    </a:ext>
+                  </a:extLst>
+                </a:gridCol>
+              </a:tblGrid>
+              <a:tr h="448822">
+                <a:tc>
+                  <a:txBody>
+                    <a:bodyPr/>
+                    <a:lstStyle/>
+                    <a:p>
+                      <a:pPr algn="ctr"/>
+                      <a:r>
+                        <a:rPr lang="en-US" sz="4000" dirty="0" smtClean="0"/>
+                        <a:t>E</a:t>
+                      </a:r>
+                      <a:endParaRPr lang="en-US" sz="4000" dirty="0"/>
+                    </a:p>
+                  </a:txBody>
+                  <a:tcPr/>
+                </a:tc>
+                <a:tc>
+                  <a:txBody>
+                    <a:bodyPr/>
+                    <a:lstStyle/>
+                    <a:p>
+                      <a:pPr algn="ctr"/>
+                      <a:r>
+                        <a:rPr lang="en-US" sz="4000" dirty="0" smtClean="0"/>
+                        <a:t>D</a:t>
+                      </a:r>
+                      <a:endParaRPr lang="en-US" sz="4000" dirty="0"/>
+                    </a:p>
+                  </a:txBody>
+                  <a:tcPr/>
+                </a:tc>
+                <a:extLst>
+                  <a:ext uri="{0D108BD9-81ED-4DB2-BD59-A6C34878D82A}">
+                    <a16:rowId xmlns:a16="http://schemas.microsoft.com/office/drawing/2014/main" val="3234467160"/>
+                  </a:ext>
+                </a:extLst>
+              </a:tr>
+            </a:tbl>
+          </a:graphicData>
+        </a:graphic>
+      </p:graphicFrame>
+      <p:graphicFrame>
+        <p:nvGraphicFramePr>
+          <p:cNvPr id="8" name="Tabelle 7"/>
+          <p:cNvGraphicFramePr>
+            <a:graphicFrameLocks noGrp="1"/>
+          </p:cNvGraphicFramePr>
+          <p:nvPr>
+            <p:extLst>
+              <p:ext uri="{D42A27DB-BD31-4B8C-83A1-F6EECF244321}">
+                <p14:modId xmlns:p14="http://schemas.microsoft.com/office/powerpoint/2010/main" val="4136009838"/>
+              </p:ext>
+            </p:extLst>
+          </p:nvPr>
+        </p:nvGraphicFramePr>
+        <p:xfrm>
+          <a:off x="6382599" y="4147251"/>
+          <a:ext cx="1836000" cy="701040"/>
+        </p:xfrm>
+        <a:graphic>
+          <a:graphicData uri="http://schemas.openxmlformats.org/drawingml/2006/table">
+            <a:tbl>
+              <a:tblPr firstRow="1" bandRow="1">
+                <a:tableStyleId>{5940675A-B579-460E-94D1-54222C63F5DA}</a:tableStyleId>
+              </a:tblPr>
+              <a:tblGrid>
+                <a:gridCol w="612000">
+                  <a:extLst>
+                    <a:ext uri="{9D8B030D-6E8A-4147-A177-3AD203B41FA5}">
+                      <a16:colId xmlns:a16="http://schemas.microsoft.com/office/drawing/2014/main" val="142950798"/>
+                    </a:ext>
+                  </a:extLst>
+                </a:gridCol>
+                <a:gridCol w="612000">
+                  <a:extLst>
+                    <a:ext uri="{9D8B030D-6E8A-4147-A177-3AD203B41FA5}">
+                      <a16:colId xmlns:a16="http://schemas.microsoft.com/office/drawing/2014/main" val="1157056818"/>
+                    </a:ext>
+                  </a:extLst>
+                </a:gridCol>
+                <a:gridCol w="612000">
+                  <a:extLst>
+                    <a:ext uri="{9D8B030D-6E8A-4147-A177-3AD203B41FA5}">
+                      <a16:colId xmlns:a16="http://schemas.microsoft.com/office/drawing/2014/main" val="853121632"/>
+                    </a:ext>
+                  </a:extLst>
+                </a:gridCol>
+              </a:tblGrid>
+              <a:tr h="448822">
+                <a:tc>
+                  <a:txBody>
+                    <a:bodyPr/>
+                    <a:lstStyle/>
+                    <a:p>
+                      <a:pPr algn="ctr"/>
+                      <a:r>
+                        <a:rPr lang="en-US" sz="4000" dirty="0" smtClean="0"/>
+                        <a:t>I</a:t>
+                      </a:r>
+                      <a:endParaRPr lang="en-US" sz="4000" dirty="0"/>
+                    </a:p>
+                  </a:txBody>
+                  <a:tcPr/>
+                </a:tc>
+                <a:tc>
+                  <a:txBody>
+                    <a:bodyPr/>
+                    <a:lstStyle/>
+                    <a:p>
+                      <a:pPr algn="ctr"/>
+                      <a:r>
+                        <a:rPr lang="en-US" sz="4000" dirty="0" smtClean="0"/>
+                        <a:t>N</a:t>
+                      </a:r>
+                      <a:endParaRPr lang="en-US" sz="4000" dirty="0"/>
+                    </a:p>
+                  </a:txBody>
+                  <a:tcPr/>
+                </a:tc>
+                <a:tc>
+                  <a:txBody>
+                    <a:bodyPr/>
+                    <a:lstStyle/>
+                    <a:p>
+                      <a:pPr algn="ctr"/>
+                      <a:r>
+                        <a:rPr lang="en-US" sz="4000" dirty="0" smtClean="0"/>
+                        <a:t>G</a:t>
+                      </a:r>
+                      <a:endParaRPr lang="en-US" sz="4000" dirty="0"/>
+                    </a:p>
+                  </a:txBody>
+                  <a:tcPr/>
+                </a:tc>
+                <a:extLst>
+                  <a:ext uri="{0D108BD9-81ED-4DB2-BD59-A6C34878D82A}">
+                    <a16:rowId xmlns:a16="http://schemas.microsoft.com/office/drawing/2014/main" val="3234467160"/>
+                  </a:ext>
+                </a:extLst>
+              </a:tr>
+            </a:tbl>
+          </a:graphicData>
+        </a:graphic>
+      </p:graphicFrame>
+      <p:cxnSp>
+        <p:nvCxnSpPr>
+          <p:cNvPr id="14" name="Gewinkelter Verbinder 13"/>
+          <p:cNvCxnSpPr/>
+          <p:nvPr/>
+        </p:nvCxnSpPr>
+        <p:spPr>
+          <a:xfrm rot="16200000" flipH="1">
+            <a:off x="5131078" y="3968410"/>
+            <a:ext cx="1186497" cy="573264"/>
+          </a:xfrm>
+          <a:prstGeom prst="bentConnector3">
+            <a:avLst>
+              <a:gd name="adj1" fmla="val 100026"/>
+            </a:avLst>
+          </a:prstGeom>
+          <a:ln>
+            <a:tailEnd type="triangle"/>
+          </a:ln>
+        </p:spPr>
+        <p:style>
+          <a:lnRef idx="1">
+            <a:schemeClr val="dk1"/>
+          </a:lnRef>
+          <a:fillRef idx="0">
+            <a:schemeClr val="dk1"/>
+          </a:fillRef>
+          <a:effectRef idx="0">
+            <a:schemeClr val="dk1"/>
+          </a:effectRef>
+          <a:fontRef idx="minor">
+            <a:schemeClr val="tx1"/>
+          </a:fontRef>
+        </p:style>
+      </p:cxnSp>
+      <p:cxnSp>
+        <p:nvCxnSpPr>
+          <p:cNvPr id="16" name="Gewinkelter Verbinder 15"/>
+          <p:cNvCxnSpPr/>
+          <p:nvPr/>
+        </p:nvCxnSpPr>
+        <p:spPr>
+          <a:xfrm rot="5400000" flipH="1" flipV="1">
+            <a:off x="5319175" y="2619497"/>
+            <a:ext cx="810302" cy="573265"/>
+          </a:xfrm>
+          <a:prstGeom prst="bentConnector3">
+            <a:avLst>
+              <a:gd name="adj1" fmla="val 99143"/>
+            </a:avLst>
+          </a:prstGeom>
+          <a:ln>
+            <a:tailEnd type="triangle"/>
+          </a:ln>
+        </p:spPr>
+        <p:style>
+          <a:lnRef idx="1">
+            <a:schemeClr val="dk1"/>
+          </a:lnRef>
+          <a:fillRef idx="0">
+            <a:schemeClr val="dk1"/>
+          </a:fillRef>
+          <a:effectRef idx="0">
+            <a:schemeClr val="dk1"/>
+          </a:effectRef>
+          <a:fontRef idx="minor">
+            <a:schemeClr val="tx1"/>
+          </a:fontRef>
+        </p:style>
+      </p:cxnSp>
+      <p:cxnSp>
+        <p:nvCxnSpPr>
+          <p:cNvPr id="32" name="Gerade Verbindung mit Pfeil 31"/>
+          <p:cNvCxnSpPr/>
+          <p:nvPr/>
+        </p:nvCxnSpPr>
+        <p:spPr>
+          <a:xfrm>
+            <a:off x="5437693" y="3661793"/>
+            <a:ext cx="573266" cy="0"/>
+          </a:xfrm>
+          <a:prstGeom prst="straightConnector1">
+            <a:avLst/>
+          </a:prstGeom>
+          <a:ln>
+            <a:tailEnd type="triangle"/>
+          </a:ln>
+        </p:spPr>
+        <p:style>
+          <a:lnRef idx="1">
+            <a:schemeClr val="dk1"/>
+          </a:lnRef>
+          <a:fillRef idx="0">
+            <a:schemeClr val="dk1"/>
+          </a:fillRef>
+          <a:effectRef idx="0">
+            <a:schemeClr val="dk1"/>
+          </a:effectRef>
+          <a:fontRef idx="minor">
+            <a:schemeClr val="tx1"/>
+          </a:fontRef>
+        </p:style>
+      </p:cxnSp>
+      <p:sp>
+        <p:nvSpPr>
+          <p:cNvPr id="33" name="Textfeld 32"/>
+          <p:cNvSpPr txBox="1"/>
+          <p:nvPr/>
+        </p:nvSpPr>
+        <p:spPr>
+          <a:xfrm>
+            <a:off x="3580905" y="4313105"/>
+            <a:ext cx="1265579" cy="369332"/>
+          </a:xfrm>
+          <a:prstGeom prst="rect">
+            <a:avLst/>
+          </a:prstGeom>
+          <a:noFill/>
+        </p:spPr>
+        <p:txBody>
+          <a:bodyPr wrap="square" rtlCol="0">
+            <a:spAutoFit/>
+          </a:bodyPr>
+          <a:lstStyle/>
+          <a:p>
+            <a:r>
+              <a:rPr lang="en-US" dirty="0" smtClean="0"/>
+              <a:t>Word Stem</a:t>
+            </a:r>
+            <a:endParaRPr lang="en-US" dirty="0"/>
+          </a:p>
+        </p:txBody>
+      </p:sp>
+      <p:sp>
+        <p:nvSpPr>
+          <p:cNvPr id="34" name="Textfeld 33"/>
+          <p:cNvSpPr txBox="1"/>
+          <p:nvPr/>
+        </p:nvSpPr>
+        <p:spPr>
+          <a:xfrm>
+            <a:off x="6667809" y="4948158"/>
+            <a:ext cx="1265579" cy="369332"/>
+          </a:xfrm>
+          <a:prstGeom prst="rect">
+            <a:avLst/>
+          </a:prstGeom>
+          <a:noFill/>
+        </p:spPr>
+        <p:txBody>
+          <a:bodyPr wrap="square" rtlCol="0">
+            <a:spAutoFit/>
+          </a:bodyPr>
+          <a:lstStyle/>
+          <a:p>
+            <a:r>
+              <a:rPr lang="en-US" dirty="0" smtClean="0"/>
+              <a:t>Inflections</a:t>
+            </a:r>
+            <a:endParaRPr lang="en-US" dirty="0"/>
+          </a:p>
+        </p:txBody>
+      </p:sp>
+    </p:spTree>
+    <p:extLst>
+      <p:ext uri="{BB962C8B-B14F-4D97-AF65-F5344CB8AC3E}">
+        <p14:creationId xmlns:p14="http://schemas.microsoft.com/office/powerpoint/2010/main" val="2653007369"/>
+      </p:ext>
+    </p:extLst>
+  </p:cSld>
+  <p:clrMapOvr>
+    <a:masterClrMapping/>
+  </p:clrMapOvr>
+</p:sld>
+</file>
+
+<file path=ppt/slides/slide14.xml><?xml version="1.0" encoding="utf-8"?>
+<p:sld xmlns:a="http://schemas.openxmlformats.org/drawingml/2006/main" xmlns:r="http://schemas.openxmlformats.org/officeDocument/2006/relationships" xmlns:p="http://schemas.openxmlformats.org/presentationml/2006/main">
+  <p:cSld>
+    <p:spTree>
+      <p:nvGrpSpPr>
+        <p:cNvPr id="1" name=""/>
+        <p:cNvGrpSpPr/>
+        <p:nvPr/>
+      </p:nvGrpSpPr>
+      <p:grpSpPr>
+        <a:xfrm>
+          <a:off x="0" y="0"/>
+          <a:ext cx="0" cy="0"/>
+          <a:chOff x="0" y="0"/>
+          <a:chExt cx="0" cy="0"/>
+        </a:xfrm>
+      </p:grpSpPr>
+      <p:sp>
+        <p:nvSpPr>
+          <p:cNvPr id="2" name="Titel 1"/>
+          <p:cNvSpPr>
+            <a:spLocks noGrp="1"/>
+          </p:cNvSpPr>
+          <p:nvPr>
+            <p:ph type="title"/>
+          </p:nvPr>
+        </p:nvSpPr>
+        <p:spPr/>
+        <p:txBody>
+          <a:bodyPr/>
+          <a:lstStyle/>
+          <a:p>
+            <a:r>
+              <a:rPr lang="en-US" dirty="0" smtClean="0"/>
+              <a:t>Stemming, </a:t>
+            </a:r>
+            <a:r>
+              <a:rPr lang="en-US" dirty="0"/>
+              <a:t>Lemmatization</a:t>
+            </a:r>
+          </a:p>
+        </p:txBody>
+      </p:sp>
+      <p:sp>
+        <p:nvSpPr>
+          <p:cNvPr id="3" name="Inhaltsplatzhalter 2"/>
+          <p:cNvSpPr>
+            <a:spLocks noGrp="1"/>
+          </p:cNvSpPr>
+          <p:nvPr>
+            <p:ph idx="1"/>
+          </p:nvPr>
+        </p:nvSpPr>
+        <p:spPr>
+          <a:xfrm>
+            <a:off x="838200" y="1825624"/>
+            <a:ext cx="10515600" cy="4773479"/>
+          </a:xfrm>
+        </p:spPr>
+        <p:txBody>
+          <a:bodyPr>
+            <a:normAutofit lnSpcReduction="10000"/>
+          </a:bodyPr>
+          <a:lstStyle/>
+          <a:p>
+            <a:r>
+              <a:rPr lang="en-GB" dirty="0" smtClean="0"/>
+              <a:t>Is </a:t>
+            </a:r>
+            <a:r>
+              <a:rPr lang="en-GB" dirty="0"/>
+              <a:t>not always a good idea</a:t>
+            </a:r>
+            <a:r>
+              <a:rPr lang="de-DE" dirty="0" smtClean="0"/>
+              <a:t>: potential </a:t>
+            </a:r>
+            <a:r>
+              <a:rPr lang="de-DE" dirty="0" err="1" smtClean="0"/>
+              <a:t>errors</a:t>
+            </a:r>
+            <a:endParaRPr lang="de-DE" dirty="0" smtClean="0"/>
+          </a:p>
+          <a:p>
+            <a:pPr marL="0" indent="0">
+              <a:buNone/>
+            </a:pPr>
+            <a:endParaRPr lang="de-DE" dirty="0" smtClean="0"/>
+          </a:p>
+          <a:p>
+            <a:pPr lvl="1"/>
+            <a:r>
+              <a:rPr lang="de-DE" dirty="0" err="1" smtClean="0"/>
+              <a:t>Overstemming</a:t>
+            </a:r>
+            <a:r>
+              <a:rPr lang="de-DE" dirty="0" smtClean="0"/>
+              <a:t>: </a:t>
+            </a:r>
+            <a:r>
+              <a:rPr lang="de-DE" i="1" dirty="0" err="1" smtClean="0"/>
+              <a:t>politics</a:t>
+            </a:r>
+            <a:r>
+              <a:rPr lang="de-DE" i="1" dirty="0" smtClean="0"/>
+              <a:t> </a:t>
+            </a:r>
+            <a:r>
+              <a:rPr lang="de-DE" i="1" dirty="0" smtClean="0">
+                <a:sym typeface="Wingdings" panose="05000000000000000000" pitchFamily="2" charset="2"/>
+              </a:rPr>
+              <a:t> </a:t>
+            </a:r>
+            <a:r>
+              <a:rPr lang="de-DE" i="1" dirty="0" err="1" smtClean="0">
+                <a:sym typeface="Wingdings" panose="05000000000000000000" pitchFamily="2" charset="2"/>
+              </a:rPr>
+              <a:t>polit</a:t>
+            </a:r>
+            <a:endParaRPr lang="de-DE" i="1" dirty="0" smtClean="0"/>
+          </a:p>
+          <a:p>
+            <a:pPr lvl="1"/>
+            <a:r>
+              <a:rPr lang="de-DE" dirty="0" err="1" smtClean="0"/>
+              <a:t>Understemming</a:t>
+            </a:r>
+            <a:r>
+              <a:rPr lang="de-DE" dirty="0" smtClean="0"/>
+              <a:t>: </a:t>
+            </a:r>
+            <a:r>
+              <a:rPr lang="de-DE" i="1" dirty="0" err="1" smtClean="0"/>
+              <a:t>travels</a:t>
+            </a:r>
+            <a:r>
+              <a:rPr lang="de-DE" i="1" dirty="0" smtClean="0"/>
+              <a:t> </a:t>
+            </a:r>
+            <a:r>
+              <a:rPr lang="de-DE" i="1" dirty="0" smtClean="0">
+                <a:sym typeface="Wingdings" panose="05000000000000000000" pitchFamily="2" charset="2"/>
+              </a:rPr>
+              <a:t> </a:t>
+            </a:r>
+            <a:r>
+              <a:rPr lang="de-DE" i="1" dirty="0" err="1" smtClean="0">
+                <a:sym typeface="Wingdings" panose="05000000000000000000" pitchFamily="2" charset="2"/>
+              </a:rPr>
+              <a:t>trav</a:t>
+            </a:r>
+            <a:r>
+              <a:rPr lang="de-DE" i="1" dirty="0" smtClean="0">
+                <a:sym typeface="Wingdings" panose="05000000000000000000" pitchFamily="2" charset="2"/>
+              </a:rPr>
+              <a:t> </a:t>
+            </a:r>
+            <a:r>
+              <a:rPr lang="de-DE" dirty="0" smtClean="0">
+                <a:sym typeface="Wingdings" panose="05000000000000000000" pitchFamily="2" charset="2"/>
+              </a:rPr>
+              <a:t>but </a:t>
+            </a:r>
+            <a:r>
+              <a:rPr lang="de-DE" i="1" dirty="0" err="1" smtClean="0">
+                <a:sym typeface="Wingdings" panose="05000000000000000000" pitchFamily="2" charset="2"/>
+              </a:rPr>
+              <a:t>travelled</a:t>
+            </a:r>
+            <a:r>
+              <a:rPr lang="de-DE" i="1" dirty="0" smtClean="0">
+                <a:sym typeface="Wingdings" panose="05000000000000000000" pitchFamily="2" charset="2"/>
+              </a:rPr>
+              <a:t>  </a:t>
+            </a:r>
+            <a:r>
+              <a:rPr lang="de-DE" i="1" dirty="0" err="1" smtClean="0">
+                <a:sym typeface="Wingdings" panose="05000000000000000000" pitchFamily="2" charset="2"/>
+              </a:rPr>
+              <a:t>travel</a:t>
+            </a:r>
+            <a:endParaRPr lang="en-GB" i="1" dirty="0"/>
+          </a:p>
+          <a:p>
+            <a:endParaRPr lang="de-DE" dirty="0" smtClean="0"/>
+          </a:p>
+          <a:p>
+            <a:r>
+              <a:rPr lang="en-US" dirty="0" smtClean="0"/>
+              <a:t>Another technique: Lemmatization </a:t>
+            </a:r>
+          </a:p>
+          <a:p>
+            <a:endParaRPr lang="en-US" dirty="0" smtClean="0"/>
+          </a:p>
+          <a:p>
+            <a:pPr lvl="1"/>
+            <a:r>
+              <a:rPr lang="en-US" dirty="0" smtClean="0"/>
+              <a:t>Get back to the root word (not root stem)</a:t>
+            </a:r>
+          </a:p>
+          <a:p>
+            <a:pPr lvl="1"/>
+            <a:r>
+              <a:rPr lang="en-US" dirty="0" smtClean="0"/>
+              <a:t>Difference: the lemma will always be present in the dictionary (lexicographically correct word)</a:t>
+            </a:r>
+          </a:p>
+          <a:p>
+            <a:pPr lvl="1"/>
+            <a:r>
+              <a:rPr lang="en-US" dirty="0" smtClean="0"/>
+              <a:t>Slower</a:t>
+            </a:r>
+            <a:endParaRPr lang="en-US" dirty="0"/>
+          </a:p>
+          <a:p>
+            <a:pPr lvl="1"/>
+            <a:endParaRPr lang="en-US" dirty="0" smtClean="0"/>
+          </a:p>
+        </p:txBody>
+      </p:sp>
+      <p:sp>
+        <p:nvSpPr>
+          <p:cNvPr id="4" name="Foliennummernplatzhalter 3"/>
+          <p:cNvSpPr>
+            <a:spLocks noGrp="1"/>
+          </p:cNvSpPr>
+          <p:nvPr>
+            <p:ph type="sldNum" sz="quarter" idx="12"/>
+          </p:nvPr>
+        </p:nvSpPr>
+        <p:spPr/>
+        <p:txBody>
+          <a:bodyPr/>
+          <a:lstStyle/>
+          <a:p>
+            <a:fld id="{C9E0B00B-E6DF-4183-A694-3DE28BEFB357}" type="slidenum">
+              <a:rPr lang="en-US" smtClean="0"/>
+              <a:t>14</a:t>
+            </a:fld>
+            <a:endParaRPr lang="en-US"/>
+          </a:p>
+        </p:txBody>
+      </p:sp>
+    </p:spTree>
+    <p:extLst>
+      <p:ext uri="{BB962C8B-B14F-4D97-AF65-F5344CB8AC3E}">
+        <p14:creationId xmlns:p14="http://schemas.microsoft.com/office/powerpoint/2010/main" val="4273802801"/>
+      </p:ext>
+    </p:extLst>
+  </p:cSld>
+  <p:clrMapOvr>
+    <a:masterClrMapping/>
+  </p:clrMapOvr>
+</p:sld>
+</file>
+
+<file path=ppt/slides/slide15.xml><?xml version="1.0" encoding="utf-8"?>
+<p:sld xmlns:a="http://schemas.openxmlformats.org/drawingml/2006/main" xmlns:r="http://schemas.openxmlformats.org/officeDocument/2006/relationships" xmlns:p="http://schemas.openxmlformats.org/presentationml/2006/main">
+  <p:cSld>
+    <p:spTree>
+      <p:nvGrpSpPr>
+        <p:cNvPr id="1" name=""/>
+        <p:cNvGrpSpPr/>
+        <p:nvPr/>
+      </p:nvGrpSpPr>
+      <p:grpSpPr>
+        <a:xfrm>
+          <a:off x="0" y="0"/>
+          <a:ext cx="0" cy="0"/>
+          <a:chOff x="0" y="0"/>
+          <a:chExt cx="0" cy="0"/>
+        </a:xfrm>
+      </p:grpSpPr>
+      <p:sp>
+        <p:nvSpPr>
+          <p:cNvPr id="2" name="Titel 1"/>
+          <p:cNvSpPr>
+            <a:spLocks noGrp="1"/>
+          </p:cNvSpPr>
+          <p:nvPr>
+            <p:ph type="title"/>
+          </p:nvPr>
+        </p:nvSpPr>
+        <p:spPr/>
+        <p:txBody>
+          <a:bodyPr/>
+          <a:lstStyle/>
+          <a:p>
+            <a:r>
+              <a:rPr lang="en-US" b="1" dirty="0">
+                <a:effectLst>
+                  <a:outerShdw blurRad="38100" dist="38100" dir="2700000" algn="tl">
+                    <a:srgbClr val="000000">
+                      <a:alpha val="43137"/>
+                    </a:srgbClr>
+                  </a:outerShdw>
+                </a:effectLst>
+              </a:rPr>
+              <a:t>Part II: Scraping &amp; Text Cleaning</a:t>
+            </a:r>
+          </a:p>
+        </p:txBody>
+      </p:sp>
+      <p:sp>
+        <p:nvSpPr>
+          <p:cNvPr id="3" name="Textplatzhalter 2"/>
+          <p:cNvSpPr>
+            <a:spLocks noGrp="1"/>
+          </p:cNvSpPr>
+          <p:nvPr>
+            <p:ph type="body" idx="1"/>
+          </p:nvPr>
+        </p:nvSpPr>
+        <p:spPr/>
+        <p:txBody>
+          <a:bodyPr/>
+          <a:lstStyle/>
+          <a:p>
+            <a:r>
+              <a:rPr lang="en-US" b="1" dirty="0" smtClean="0">
+                <a:effectLst>
+                  <a:outerShdw blurRad="38100" dist="38100" dir="2700000" algn="tl">
+                    <a:srgbClr val="000000">
+                      <a:alpha val="43137"/>
+                    </a:srgbClr>
+                  </a:outerShdw>
+                </a:effectLst>
+              </a:rPr>
+              <a:t>Practical Application</a:t>
+            </a:r>
+            <a:endParaRPr lang="en-US" b="1" dirty="0">
+              <a:effectLst>
+                <a:outerShdw blurRad="38100" dist="38100" dir="2700000" algn="tl">
+                  <a:srgbClr val="000000">
+                    <a:alpha val="43137"/>
+                  </a:srgbClr>
+                </a:outerShdw>
+              </a:effectLst>
+            </a:endParaRPr>
+          </a:p>
+        </p:txBody>
+      </p:sp>
+      <p:sp>
+        <p:nvSpPr>
+          <p:cNvPr id="4" name="Foliennummernplatzhalter 3"/>
+          <p:cNvSpPr>
+            <a:spLocks noGrp="1"/>
+          </p:cNvSpPr>
+          <p:nvPr>
+            <p:ph type="sldNum" sz="quarter" idx="12"/>
+          </p:nvPr>
+        </p:nvSpPr>
+        <p:spPr/>
+        <p:txBody>
+          <a:bodyPr/>
+          <a:lstStyle/>
+          <a:p>
+            <a:fld id="{C9E0B00B-E6DF-4183-A694-3DE28BEFB357}" type="slidenum">
+              <a:rPr lang="en-US" smtClean="0"/>
+              <a:t>15</a:t>
+            </a:fld>
+            <a:endParaRPr lang="en-US"/>
+          </a:p>
+        </p:txBody>
+      </p:sp>
+    </p:spTree>
+    <p:extLst>
+      <p:ext uri="{BB962C8B-B14F-4D97-AF65-F5344CB8AC3E}">
+        <p14:creationId xmlns:p14="http://schemas.microsoft.com/office/powerpoint/2010/main" val="870340316"/>
+      </p:ext>
+    </p:extLst>
+  </p:cSld>
+  <p:clrMapOvr>
+    <a:masterClrMapping/>
+  </p:clrMapOvr>
+</p:sld>
+</file>
+
+<file path=ppt/slides/slide16.xml><?xml version="1.0" encoding="utf-8"?>
+<p:sld xmlns:a="http://schemas.openxmlformats.org/drawingml/2006/main" xmlns:r="http://schemas.openxmlformats.org/officeDocument/2006/relationships" xmlns:p="http://schemas.openxmlformats.org/presentationml/2006/main">
+  <p:cSld>
+    <p:spTree>
+      <p:nvGrpSpPr>
+        <p:cNvPr id="1" name=""/>
+        <p:cNvGrpSpPr/>
+        <p:nvPr/>
+      </p:nvGrpSpPr>
+      <p:grpSpPr>
+        <a:xfrm>
+          <a:off x="0" y="0"/>
+          <a:ext cx="0" cy="0"/>
+          <a:chOff x="0" y="0"/>
+          <a:chExt cx="0" cy="0"/>
+        </a:xfrm>
+      </p:grpSpPr>
+      <p:sp>
+        <p:nvSpPr>
+          <p:cNvPr id="3" name="Inhaltsplatzhalter 2"/>
+          <p:cNvSpPr>
+            <a:spLocks noGrp="1"/>
+          </p:cNvSpPr>
+          <p:nvPr>
+            <p:ph idx="1"/>
+          </p:nvPr>
+        </p:nvSpPr>
+        <p:spPr>
+          <a:xfrm>
+            <a:off x="838200" y="385011"/>
+            <a:ext cx="10515600" cy="6336464"/>
+          </a:xfrm>
+        </p:spPr>
+        <p:txBody>
+          <a:bodyPr>
+            <a:normAutofit/>
+          </a:bodyPr>
+          <a:lstStyle/>
+          <a:p>
+            <a:pPr marL="0" indent="0">
+              <a:buNone/>
+            </a:pPr>
+            <a:r>
+              <a:rPr lang="en-US" b="1" u="sng" dirty="0" smtClean="0"/>
+              <a:t>Preparation</a:t>
+            </a:r>
+            <a:r>
+              <a:rPr lang="en-US" dirty="0" smtClean="0"/>
+              <a:t>: </a:t>
+            </a:r>
+          </a:p>
+          <a:p>
+            <a:pPr marL="914400" lvl="1" indent="-457200">
+              <a:buFont typeface="+mj-lt"/>
+              <a:buAutoNum type="arabicParenR"/>
+            </a:pPr>
+            <a:r>
+              <a:rPr lang="en-US" dirty="0" smtClean="0"/>
+              <a:t>Get an access to Google Collab</a:t>
+            </a:r>
+          </a:p>
+          <a:p>
+            <a:pPr marL="914400" lvl="1" indent="-457200">
+              <a:buFont typeface="+mj-lt"/>
+              <a:buAutoNum type="arabicParenR"/>
+            </a:pPr>
+            <a:r>
+              <a:rPr lang="en-US" dirty="0" smtClean="0"/>
+              <a:t>Open </a:t>
+            </a:r>
+            <a:r>
+              <a:rPr lang="en-US" dirty="0" err="1" smtClean="0"/>
+              <a:t>Jupyter</a:t>
+            </a:r>
+            <a:r>
+              <a:rPr lang="en-US" dirty="0" smtClean="0"/>
+              <a:t> </a:t>
+            </a:r>
+            <a:r>
+              <a:rPr lang="en-US" dirty="0"/>
+              <a:t>Notebook: </a:t>
+            </a:r>
+            <a:r>
+              <a:rPr lang="en-US" dirty="0" err="1" smtClean="0"/>
+              <a:t>Tutorial_Scraping_RegEx.ipynb</a:t>
+            </a:r>
+            <a:endParaRPr lang="en-US" dirty="0" smtClean="0"/>
+          </a:p>
+          <a:p>
+            <a:pPr marL="914400" lvl="1" indent="-457200">
+              <a:buFont typeface="+mj-lt"/>
+              <a:buAutoNum type="arabicParenR"/>
+            </a:pPr>
+            <a:r>
+              <a:rPr lang="en-US" dirty="0" smtClean="0"/>
+              <a:t>Set up R</a:t>
+            </a:r>
+            <a:endParaRPr lang="en-US" dirty="0"/>
+          </a:p>
+          <a:p>
+            <a:pPr marL="0" indent="0">
+              <a:buNone/>
+            </a:pPr>
+            <a:r>
+              <a:rPr lang="en-US" b="1" u="sng" dirty="0" smtClean="0"/>
+              <a:t>Exercises:</a:t>
+            </a:r>
+          </a:p>
+          <a:p>
+            <a:pPr marL="971550" lvl="1" indent="-514350">
+              <a:buFont typeface="Arial" panose="020B0604020202020204" pitchFamily="34" charset="0"/>
+              <a:buAutoNum type="arabicParenR"/>
+            </a:pPr>
+            <a:r>
+              <a:rPr lang="en-US" dirty="0" smtClean="0"/>
+              <a:t>Web Scraping: Extract the Titles and Texts from the following webpage and save in a </a:t>
+            </a:r>
+            <a:r>
+              <a:rPr lang="en-US" dirty="0"/>
+              <a:t>data frame: https://practicewebscrapingsite.wordpress.com/example-1</a:t>
+            </a:r>
+            <a:endParaRPr lang="en-US" dirty="0" smtClean="0"/>
+          </a:p>
+          <a:p>
+            <a:pPr marL="971550" lvl="1" indent="-514350">
+              <a:buFont typeface="Arial" panose="020B0604020202020204" pitchFamily="34" charset="0"/>
+              <a:buAutoNum type="arabicParenR"/>
+            </a:pPr>
+            <a:r>
+              <a:rPr lang="en-US" dirty="0" smtClean="0"/>
+              <a:t>Twitter Scraping: </a:t>
+            </a:r>
+          </a:p>
+          <a:p>
+            <a:pPr marL="1428750" lvl="2" indent="-514350">
+              <a:buFont typeface="Arial" panose="020B0604020202020204" pitchFamily="34" charset="0"/>
+              <a:buAutoNum type="arabicParenR"/>
+            </a:pPr>
+            <a:r>
+              <a:rPr lang="en-US" dirty="0" smtClean="0"/>
+              <a:t>Scrape 500 tweets with hashtag “</a:t>
+            </a:r>
+            <a:r>
+              <a:rPr lang="en-US" dirty="0" err="1" smtClean="0"/>
+              <a:t>covid</a:t>
+            </a:r>
+            <a:r>
+              <a:rPr lang="en-US" dirty="0" smtClean="0"/>
+              <a:t>” (exclude retweets)</a:t>
+            </a:r>
+          </a:p>
+          <a:p>
+            <a:pPr marL="1428750" lvl="2" indent="-514350">
+              <a:buFont typeface="Arial" panose="020B0604020202020204" pitchFamily="34" charset="0"/>
+              <a:buAutoNum type="arabicParenR"/>
+            </a:pPr>
+            <a:r>
+              <a:rPr lang="en-US" dirty="0" smtClean="0"/>
+              <a:t>Visualize the timeline by hours and by minutes. Which one is more appropriate?</a:t>
+            </a:r>
+          </a:p>
+          <a:p>
+            <a:pPr marL="1428750" lvl="2" indent="-514350">
+              <a:buFont typeface="Arial" panose="020B0604020202020204" pitchFamily="34" charset="0"/>
+              <a:buAutoNum type="arabicParenR"/>
+            </a:pPr>
+            <a:r>
+              <a:rPr lang="en-US" dirty="0" smtClean="0"/>
+              <a:t>Print the most retweeted tweet.</a:t>
+            </a:r>
+          </a:p>
+          <a:p>
+            <a:pPr marL="914400" lvl="1" indent="-457200">
+              <a:buAutoNum type="arabicParenR" startAt="3"/>
+            </a:pPr>
+            <a:r>
+              <a:rPr lang="en-US" dirty="0" smtClean="0"/>
+              <a:t>Regular Expressions:</a:t>
+            </a:r>
+          </a:p>
+          <a:p>
+            <a:pPr marL="914400" lvl="2" indent="0">
+              <a:buNone/>
+            </a:pPr>
+            <a:r>
+              <a:rPr lang="en-US" dirty="0" smtClean="0"/>
+              <a:t>1)     See:  </a:t>
+            </a:r>
+            <a:r>
+              <a:rPr lang="en-US" dirty="0" err="1"/>
+              <a:t>Tutorial_Scraping_RegEx.ipynb</a:t>
+            </a:r>
+            <a:endParaRPr lang="en-US" dirty="0"/>
+          </a:p>
+          <a:p>
+            <a:pPr marL="914400" lvl="2" indent="0">
+              <a:buNone/>
+            </a:pPr>
+            <a:endParaRPr lang="en-US" dirty="0" smtClean="0"/>
+          </a:p>
+          <a:p>
+            <a:pPr marL="457200" lvl="1" indent="0">
+              <a:buNone/>
+            </a:pPr>
+            <a:endParaRPr lang="en-US" dirty="0" smtClean="0"/>
+          </a:p>
+          <a:p>
+            <a:pPr marL="0" indent="0">
+              <a:buNone/>
+            </a:pPr>
+            <a:endParaRPr lang="en-US" dirty="0" smtClean="0"/>
+          </a:p>
+          <a:p>
+            <a:pPr marL="514350" indent="-514350">
+              <a:buAutoNum type="arabicParenR"/>
+            </a:pPr>
+            <a:endParaRPr lang="en-US" dirty="0" smtClean="0"/>
+          </a:p>
+          <a:p>
+            <a:pPr marL="514350" indent="-514350">
+              <a:buAutoNum type="arabicParenR"/>
+            </a:pPr>
+            <a:endParaRPr lang="en-US" dirty="0" smtClean="0"/>
+          </a:p>
+        </p:txBody>
+      </p:sp>
+      <p:sp>
+        <p:nvSpPr>
+          <p:cNvPr id="4" name="Foliennummernplatzhalter 3"/>
+          <p:cNvSpPr>
+            <a:spLocks noGrp="1"/>
+          </p:cNvSpPr>
+          <p:nvPr>
+            <p:ph type="sldNum" sz="quarter" idx="12"/>
+          </p:nvPr>
+        </p:nvSpPr>
+        <p:spPr/>
+        <p:txBody>
+          <a:bodyPr/>
+          <a:lstStyle/>
+          <a:p>
+            <a:fld id="{C9E0B00B-E6DF-4183-A694-3DE28BEFB357}" type="slidenum">
+              <a:rPr lang="en-US" smtClean="0"/>
+              <a:t>16</a:t>
+            </a:fld>
+            <a:endParaRPr lang="en-US"/>
+          </a:p>
+        </p:txBody>
+      </p:sp>
+    </p:spTree>
+    <p:extLst>
+      <p:ext uri="{BB962C8B-B14F-4D97-AF65-F5344CB8AC3E}">
+        <p14:creationId xmlns:p14="http://schemas.microsoft.com/office/powerpoint/2010/main" val="435130784"/>
+      </p:ext>
+    </p:extLst>
+  </p:cSld>
+  <p:clrMapOvr>
+    <a:masterClrMapping/>
+  </p:clrMapOvr>
+</p:sld>
+</file>
+
+<file path=ppt/slides/slide17.xml><?xml version="1.0" encoding="utf-8"?>
+<p:sld xmlns:a="http://schemas.openxmlformats.org/drawingml/2006/main" xmlns:r="http://schemas.openxmlformats.org/officeDocument/2006/relationships" xmlns:p="http://schemas.openxmlformats.org/presentationml/2006/main">
+  <p:cSld>
+    <p:spTree>
+      <p:nvGrpSpPr>
+        <p:cNvPr id="1" name=""/>
+        <p:cNvGrpSpPr/>
+        <p:nvPr/>
+      </p:nvGrpSpPr>
+      <p:grpSpPr>
+        <a:xfrm>
+          <a:off x="0" y="0"/>
+          <a:ext cx="0" cy="0"/>
+          <a:chOff x="0" y="0"/>
+          <a:chExt cx="0" cy="0"/>
+        </a:xfrm>
+      </p:grpSpPr>
+      <p:sp>
+        <p:nvSpPr>
+          <p:cNvPr id="2" name="Titel 1"/>
+          <p:cNvSpPr>
+            <a:spLocks noGrp="1"/>
+          </p:cNvSpPr>
+          <p:nvPr>
+            <p:ph type="title"/>
+          </p:nvPr>
+        </p:nvSpPr>
+        <p:spPr/>
+        <p:txBody>
+          <a:bodyPr/>
+          <a:lstStyle/>
+          <a:p>
+            <a:r>
+              <a:rPr lang="en-US" b="1" dirty="0">
+                <a:effectLst>
+                  <a:outerShdw blurRad="38100" dist="38100" dir="2700000" algn="tl">
+                    <a:srgbClr val="000000">
+                      <a:alpha val="43137"/>
+                    </a:srgbClr>
+                  </a:outerShdw>
+                </a:effectLst>
+              </a:rPr>
+              <a:t>Part II: Scraping &amp; Text Cleaning</a:t>
+            </a:r>
+          </a:p>
+        </p:txBody>
+      </p:sp>
+      <p:sp>
+        <p:nvSpPr>
+          <p:cNvPr id="3" name="Textplatzhalter 2"/>
+          <p:cNvSpPr>
+            <a:spLocks noGrp="1"/>
+          </p:cNvSpPr>
+          <p:nvPr>
+            <p:ph type="body" idx="1"/>
+          </p:nvPr>
+        </p:nvSpPr>
+        <p:spPr/>
+        <p:txBody>
+          <a:bodyPr/>
+          <a:lstStyle/>
+          <a:p>
+            <a:r>
+              <a:rPr lang="en-US" b="1" dirty="0" smtClean="0">
+                <a:effectLst>
+                  <a:outerShdw blurRad="38100" dist="38100" dir="2700000" algn="tl">
+                    <a:srgbClr val="000000">
+                      <a:alpha val="43137"/>
+                    </a:srgbClr>
+                  </a:outerShdw>
+                </a:effectLst>
+              </a:rPr>
+              <a:t>Literature and References</a:t>
+            </a:r>
+            <a:endParaRPr lang="en-US" b="1" dirty="0">
+              <a:effectLst>
+                <a:outerShdw blurRad="38100" dist="38100" dir="2700000" algn="tl">
+                  <a:srgbClr val="000000">
+                    <a:alpha val="43137"/>
+                  </a:srgbClr>
+                </a:outerShdw>
+              </a:effectLst>
+            </a:endParaRPr>
+          </a:p>
+        </p:txBody>
+      </p:sp>
+      <p:sp>
+        <p:nvSpPr>
+          <p:cNvPr id="4" name="Foliennummernplatzhalter 3"/>
+          <p:cNvSpPr>
+            <a:spLocks noGrp="1"/>
+          </p:cNvSpPr>
+          <p:nvPr>
+            <p:ph type="sldNum" sz="quarter" idx="12"/>
+          </p:nvPr>
+        </p:nvSpPr>
+        <p:spPr/>
+        <p:txBody>
+          <a:bodyPr/>
+          <a:lstStyle/>
+          <a:p>
+            <a:fld id="{C9E0B00B-E6DF-4183-A694-3DE28BEFB357}" type="slidenum">
+              <a:rPr lang="en-US" smtClean="0"/>
+              <a:t>17</a:t>
+            </a:fld>
+            <a:endParaRPr lang="en-US"/>
+          </a:p>
+        </p:txBody>
+      </p:sp>
+    </p:spTree>
+    <p:extLst>
+      <p:ext uri="{BB962C8B-B14F-4D97-AF65-F5344CB8AC3E}">
+        <p14:creationId xmlns:p14="http://schemas.microsoft.com/office/powerpoint/2010/main" val="3419717452"/>
+      </p:ext>
+    </p:extLst>
+  </p:cSld>
+  <p:clrMapOvr>
+    <a:masterClrMapping/>
+  </p:clrMapOvr>
+</p:sld>
+</file>
+
+<file path=ppt/slides/slide18.xml><?xml version="1.0" encoding="utf-8"?>
+<p:sld xmlns:a="http://schemas.openxmlformats.org/drawingml/2006/main" xmlns:r="http://schemas.openxmlformats.org/officeDocument/2006/relationships" xmlns:p="http://schemas.openxmlformats.org/presentationml/2006/main">
+  <p:cSld>
+    <p:spTree>
+      <p:nvGrpSpPr>
+        <p:cNvPr id="1" name=""/>
+        <p:cNvGrpSpPr/>
+        <p:nvPr/>
+      </p:nvGrpSpPr>
+      <p:grpSpPr>
+        <a:xfrm>
+          <a:off x="0" y="0"/>
+          <a:ext cx="0" cy="0"/>
+          <a:chOff x="0" y="0"/>
+          <a:chExt cx="0" cy="0"/>
+        </a:xfrm>
+      </p:grpSpPr>
+      <p:sp>
+        <p:nvSpPr>
           <p:cNvPr id="3" name="Inhaltsplatzhalter 2"/>
           <p:cNvSpPr>
             <a:spLocks noGrp="1"/>
@@ -4459,7 +7708,7 @@
           <a:p>
             <a:fld id="{C9E0B00B-E6DF-4183-A694-3DE28BEFB357}" type="slidenum">
               <a:rPr lang="en-US" smtClean="0"/>
-              <a:t>13</a:t>
+              <a:t>18</a:t>
             </a:fld>
             <a:endParaRPr lang="en-US"/>
           </a:p>
@@ -4484,7 +7733,7 @@
         </p:spPr>
         <p:txBody>
           <a:bodyPr vert="horz" lIns="91440" tIns="45720" rIns="91440" bIns="45720" rtlCol="0">
-            <a:normAutofit/>
+            <a:normAutofit fontScale="77500" lnSpcReduction="20000"/>
           </a:bodyPr>
           <a:lstStyle>
             <a:lvl1pPr marL="228600" indent="-228600" algn="l" defTabSz="914400" rtl="0" eaLnBrk="1" latinLnBrk="0" hangingPunct="1">
@@ -4773,6 +8022,80 @@
               <a:rPr lang="en-US" dirty="0" smtClean="0"/>
               <a:t> (scrape tweets in python)</a:t>
             </a:r>
+          </a:p>
+          <a:p>
+            <a:r>
+              <a:rPr lang="en-US" dirty="0">
+                <a:hlinkClick r:id="rId8"/>
+              </a:rPr>
+              <a:t>https://</a:t>
+            </a:r>
+            <a:r>
+              <a:rPr lang="en-US" dirty="0" smtClean="0">
+                <a:hlinkClick r:id="rId8"/>
+              </a:rPr>
+              <a:t>r4ds.had.co.nz/strings.html</a:t>
+            </a:r>
+            <a:r>
+              <a:rPr lang="en-US" dirty="0" smtClean="0"/>
+              <a:t> (book R for data science, regex)</a:t>
+            </a:r>
+          </a:p>
+          <a:p>
+            <a:r>
+              <a:rPr lang="en-US" dirty="0">
+                <a:hlinkClick r:id="rId9"/>
+              </a:rPr>
+              <a:t>https://</a:t>
+            </a:r>
+            <a:r>
+              <a:rPr lang="en-US" dirty="0" smtClean="0">
+                <a:hlinkClick r:id="rId9"/>
+              </a:rPr>
+              <a:t>www.rstudio.com/wp-content/uploads/2016/09/RegExCheatsheet.pdf</a:t>
+            </a:r>
+            <a:r>
+              <a:rPr lang="en-US" dirty="0" smtClean="0"/>
+              <a:t> (</a:t>
+            </a:r>
+            <a:r>
+              <a:rPr lang="en-US" dirty="0" err="1" smtClean="0"/>
+              <a:t>cheatsheet</a:t>
+            </a:r>
+            <a:r>
+              <a:rPr lang="en-US" dirty="0" smtClean="0"/>
+              <a:t> regex)</a:t>
+            </a:r>
+          </a:p>
+          <a:p>
+            <a:r>
+              <a:rPr lang="en-GB" dirty="0"/>
+              <a:t>Miner, G., Elder IV, J., Fast, A., Hill, T., </a:t>
+            </a:r>
+            <a:r>
+              <a:rPr lang="en-GB" dirty="0" err="1"/>
+              <a:t>Nisbet</a:t>
+            </a:r>
+            <a:r>
+              <a:rPr lang="en-GB" dirty="0"/>
+              <a:t>, R. and </a:t>
+            </a:r>
+            <a:r>
+              <a:rPr lang="en-GB" dirty="0" err="1"/>
+              <a:t>Delen</a:t>
+            </a:r>
+            <a:r>
+              <a:rPr lang="en-GB" dirty="0"/>
+              <a:t>, D. (2012). Practical text mining and statistical analysis for non-structured text data applications, Academic Press</a:t>
+            </a:r>
+            <a:r>
+              <a:rPr lang="en-GB" dirty="0" smtClean="0"/>
+              <a:t>. (</a:t>
+            </a:r>
+            <a:r>
+              <a:rPr lang="en-GB" smtClean="0"/>
+              <a:t>text normalization</a:t>
+            </a:r>
             <a:endParaRPr lang="en-US" dirty="0"/>
           </a:p>
         </p:txBody>
@@ -4832,8 +8155,29 @@
                   </a:outerShdw>
                 </a:effectLst>
               </a:rPr>
-              <a:t>Part II: Scraping &amp; Text Cleaning</a:t>
-            </a:r>
+              <a:t>Part II: Scraping &amp; Text </a:t>
+            </a:r>
+            <a:r>
+              <a:rPr lang="en-US" b="1" dirty="0">
+                <a:effectLst>
+                  <a:outerShdw blurRad="38100" dist="38100" dir="2700000" algn="tl">
+                    <a:srgbClr val="000000">
+                      <a:alpha val="43137"/>
+                    </a:srgbClr>
+                  </a:outerShdw>
+                </a:effectLst>
+              </a:rPr>
+              <a:t>Normalization</a:t>
+            </a:r>
+            <a:endParaRPr lang="en-US" b="1" dirty="0">
+              <a:effectLst>
+                <a:outerShdw blurRad="38100" dist="38100" dir="2700000" algn="tl">
+                  <a:srgbClr val="000000">
+                    <a:alpha val="43137"/>
+                  </a:srgbClr>
+                </a:outerShdw>
+              </a:effectLst>
+            </a:endParaRPr>
           </a:p>
         </p:txBody>
       </p:sp>
@@ -5010,7 +8354,11 @@
             </a:pPr>
             <a:r>
               <a:rPr lang="en-US" dirty="0" smtClean="0"/>
-              <a:t>Basic Text Cleaning</a:t>
+              <a:t>Basic Text </a:t>
+            </a:r>
+            <a:r>
+              <a:rPr lang="en-US" dirty="0" smtClean="0"/>
+              <a:t>Normalization</a:t>
             </a:r>
             <a:endParaRPr lang="en-US" dirty="0"/>
           </a:p>
@@ -5030,15 +8378,17 @@
               <a:buAutoNum type="romanLcPeriod"/>
             </a:pPr>
             <a:r>
+              <a:rPr lang="en-US" dirty="0" err="1"/>
+              <a:t>Stopwords</a:t>
+            </a:r>
+            <a:r>
+              <a:rPr lang="en-US" dirty="0"/>
+              <a:t> </a:t>
+            </a:r>
+            <a:r>
               <a:rPr lang="en-US" dirty="0" smtClean="0"/>
-              <a:t>Stemming</a:t>
-            </a:r>
-          </a:p>
-          <a:p>
-            <a:pPr marL="1028700" lvl="1" indent="-571500">
-              <a:buFont typeface="+mj-lt"/>
-              <a:buAutoNum type="romanLcPeriod"/>
-            </a:pPr>
+              <a:t>Removal, Stemming, </a:t>
+            </a:r>
             <a:r>
               <a:rPr lang="en-US" dirty="0" smtClean="0"/>
               <a:t>Lemmatization</a:t>
@@ -5173,19 +8523,15 @@
             </a:r>
             <a:r>
               <a:rPr lang="de-DE" dirty="0" err="1" smtClean="0"/>
-              <a:t>given</a:t>
+              <a:t>webpage</a:t>
             </a:r>
             <a:r>
               <a:rPr lang="de-DE" dirty="0" smtClean="0"/>
               <a:t> </a:t>
             </a:r>
             <a:r>
-              <a:rPr lang="de-DE" dirty="0" err="1" smtClean="0"/>
-              <a:t>webpage</a:t>
-            </a:r>
-            <a:r>
               <a:rPr lang="de-DE" dirty="0"/>
-              <a:t> (https://practicewebscrapingsite.wordpress.com/example-1/)</a:t>
+              <a:t>(https://practicewebscrapingsite.wordpress.com/example-1/)</a:t>
             </a:r>
             <a:endParaRPr lang="en-US" dirty="0" smtClean="0"/>
           </a:p>
@@ -5204,24 +8550,24 @@
               <a:t>Wikipedia, </a:t>
             </a:r>
             <a:r>
-              <a:rPr lang="en-GB" dirty="0" err="1"/>
-              <a:t>labeled</a:t>
+              <a:rPr lang="en-GB" dirty="0" smtClean="0"/>
+              <a:t>labelled </a:t>
             </a:r>
             <a:r>
               <a:rPr lang="en-GB" dirty="0"/>
-              <a:t> image data </a:t>
+              <a:t>image data </a:t>
             </a:r>
             <a:r>
               <a:rPr lang="en-GB" dirty="0" smtClean="0"/>
               <a:t>from Google, social media data from Twitter, Facebook, </a:t>
             </a:r>
             <a:r>
-              <a:rPr lang="en-GB" dirty="0" err="1" smtClean="0"/>
-              <a:t>revirews</a:t>
-            </a:r>
-            <a:r>
               <a:rPr lang="en-GB" dirty="0" smtClean="0"/>
-              <a:t>, feedbacks from Amazon</a:t>
+              <a:t>reviews, </a:t>
+            </a:r>
+            <a:r>
+              <a:rPr lang="en-GB" dirty="0" smtClean="0"/>
+              <a:t>feedbacks from Amazon</a:t>
             </a:r>
             <a:endParaRPr lang="en-US" dirty="0"/>
           </a:p>
@@ -5492,11 +8838,7 @@
             </a:r>
             <a:r>
               <a:rPr lang="en-US" dirty="0" smtClean="0"/>
-              <a:t>Scraping - </a:t>
-            </a:r>
-            <a:r>
-              <a:rPr lang="en-US" dirty="0" smtClean="0"/>
-              <a:t>Objective</a:t>
+              <a:t>Scraping - Objective</a:t>
             </a:r>
             <a:endParaRPr lang="en-US" b="1" dirty="0"/>
           </a:p>

</xml_diff>